<commit_message>
full review: communication to binding
</commit_message>
<xml_diff>
--- a/ApplicationDeveloperGuide/images/managedc-communication.pptx
+++ b/ApplicationDeveloperGuide/images/managedc-communication.pptx
@@ -219,7 +219,7 @@
               <a:rPr lang="fr-FR" smtClean="0">
                 <a:latin typeface="Calibri Regular" charset="0"/>
               </a:rPr>
-              <a:t>jeudi 16 janvier 2025</a:t>
+              <a:t>vendredi 17 janvier 2025</a:t>
             </a:fld>
             <a:endParaRPr lang="en-US" dirty="0">
               <a:latin typeface="Calibri Regular" charset="0"/>
@@ -397,7 +397,7 @@
           <a:p>
             <a:fld id="{885721CF-495B-2B41-A23A-4D3221F80235}" type="datetime2">
               <a:rPr lang="fr-FR" smtClean="0"/>
-              <a:t>jeudi 16 janvier 2025</a:t>
+              <a:t>vendredi 17 janvier 2025</a:t>
             </a:fld>
             <a:endParaRPr lang="en-US" dirty="0"/>
           </a:p>
@@ -15199,7 +15199,7 @@
                 <a:effectLst/>
                 <a:latin typeface="Consolas" panose="020B0609020204030204" pitchFamily="49" charset="0"/>
               </a:rPr>
-              <a:t>method2</a:t>
+              <a:t>function2</a:t>
             </a:r>
             <a:r>
               <a:rPr kumimoji="0" lang="en-US" altLang="en-US" sz="1000" b="0" i="0" u="none" strike="noStrike" cap="none" normalizeH="0" baseline="0" dirty="0">
@@ -15454,45 +15454,6 @@
               </a:rPr>
               <a:t>@WasmFunction</a:t>
             </a:r>
-            <a:r>
-              <a:rPr kumimoji="0" lang="en-US" altLang="en-US" sz="1000" b="0" i="0" u="none" strike="noStrike" cap="none" normalizeH="0" baseline="0" dirty="0">
-                <a:ln>
-                  <a:noFill/>
-                </a:ln>
-                <a:solidFill>
-                  <a:srgbClr val="080808"/>
-                </a:solidFill>
-                <a:effectLst/>
-                <a:latin typeface="Consolas" panose="020B0609020204030204" pitchFamily="49" charset="0"/>
-              </a:rPr>
-              <a:t>(</a:t>
-            </a:r>
-            <a:r>
-              <a:rPr kumimoji="0" lang="en-US" altLang="en-US" sz="1000" b="0" i="0" u="none" strike="noStrike" cap="none" normalizeH="0" baseline="0" dirty="0">
-                <a:ln>
-                  <a:noFill/>
-                </a:ln>
-                <a:solidFill>
-                  <a:srgbClr val="067D17"/>
-                </a:solidFill>
-                <a:effectLst/>
-                <a:latin typeface="Consolas" panose="020B0609020204030204" pitchFamily="49" charset="0"/>
-              </a:rPr>
-              <a:t>"function1"</a:t>
-            </a:r>
-            <a:r>
-              <a:rPr kumimoji="0" lang="en-US" altLang="en-US" sz="1000" b="0" i="0" u="none" strike="noStrike" cap="none" normalizeH="0" baseline="0" dirty="0">
-                <a:ln>
-                  <a:noFill/>
-                </a:ln>
-                <a:solidFill>
-                  <a:srgbClr val="080808"/>
-                </a:solidFill>
-                <a:effectLst/>
-                <a:latin typeface="Consolas" panose="020B0609020204030204" pitchFamily="49" charset="0"/>
-              </a:rPr>
-              <a:t>)</a:t>
-            </a:r>
             <a:br>
               <a:rPr kumimoji="0" lang="en-US" altLang="en-US" sz="1000" b="0" i="0" u="none" strike="noStrike" cap="none" normalizeH="0" baseline="0" dirty="0">
                 <a:ln>
@@ -15542,7 +15503,7 @@
                 <a:effectLst/>
                 <a:latin typeface="Consolas" panose="020B0609020204030204" pitchFamily="49" charset="0"/>
               </a:rPr>
-              <a:t>method1</a:t>
+              <a:t>function1</a:t>
             </a:r>
             <a:r>
               <a:rPr kumimoji="0" lang="en-US" altLang="en-US" sz="1000" b="0" i="0" u="none" strike="noStrike" cap="none" normalizeH="0" baseline="0" dirty="0">
@@ -15809,7 +15770,7 @@
                 <a:effectLst/>
                 <a:latin typeface="Consolas" panose="020B0609020204030204" pitchFamily="49" charset="0"/>
               </a:rPr>
-              <a:t>method1</a:t>
+              <a:t>function1</a:t>
             </a:r>
             <a:r>
               <a:rPr kumimoji="0" lang="en-US" altLang="en-US" sz="1000" b="0" i="0" u="none" strike="noStrike" cap="none" normalizeH="0" baseline="0" dirty="0">
@@ -15903,8 +15864,8 @@
         </p:nvSpPr>
         <p:spPr bwMode="auto">
           <a:xfrm>
-            <a:off x="5839676" y="1230499"/>
-            <a:ext cx="4572000" cy="3477875"/>
+            <a:off x="5861310" y="1395375"/>
+            <a:ext cx="3386205" cy="3477875"/>
           </a:xfrm>
           <a:prstGeom prst="rect">
             <a:avLst/>
@@ -15916,7 +15877,7 @@
           <a:effectLst/>
         </p:spPr>
         <p:txBody>
-          <a:bodyPr vert="horz" wrap="none" lIns="91440" tIns="45720" rIns="91440" bIns="45720" numCol="1" anchor="ctr" anchorCtr="0" compatLnSpc="1">
+          <a:bodyPr vert="horz" wrap="none" lIns="91440" tIns="45720" rIns="91440" bIns="45720" numCol="1" anchor="t" anchorCtr="0" compatLnSpc="1">
             <a:prstTxWarp prst="textNoShape">
               <a:avLst/>
             </a:prstTxWarp>
@@ -16124,6 +16085,58 @@
               <a:buNone/>
               <a:tabLst/>
             </a:pPr>
+            <a:endParaRPr kumimoji="0" lang="en-US" altLang="en-US" sz="1000" b="0" i="1" u="none" strike="noStrike" cap="none" normalizeH="0" baseline="0" dirty="0">
+              <a:ln>
+                <a:noFill/>
+              </a:ln>
+              <a:solidFill>
+                <a:srgbClr val="808080"/>
+              </a:solidFill>
+              <a:effectLst/>
+              <a:latin typeface="Consolas" panose="020B0609020204030204" pitchFamily="49" charset="0"/>
+            </a:endParaRPr>
+          </a:p>
+          <a:p>
+            <a:pPr marL="0" marR="0" lvl="0" indent="0" algn="l" defTabSz="914400" rtl="0" eaLnBrk="0" fontAlgn="base" latinLnBrk="0" hangingPunct="0">
+              <a:lnSpc>
+                <a:spcPct val="100000"/>
+              </a:lnSpc>
+              <a:spcBef>
+                <a:spcPct val="0"/>
+              </a:spcBef>
+              <a:spcAft>
+                <a:spcPct val="0"/>
+              </a:spcAft>
+              <a:buClrTx/>
+              <a:buSzTx/>
+              <a:buFontTx/>
+              <a:buNone/>
+              <a:tabLst/>
+            </a:pPr>
+            <a:endParaRPr lang="en-US" altLang="en-US" sz="1000" i="1" dirty="0">
+              <a:solidFill>
+                <a:srgbClr val="808080"/>
+              </a:solidFill>
+              <a:latin typeface="Consolas" panose="020B0609020204030204" pitchFamily="49" charset="0"/>
+            </a:endParaRPr>
+          </a:p>
+          <a:p>
+            <a:pPr marL="0" marR="0" lvl="0" indent="0" algn="l" defTabSz="914400" rtl="0" eaLnBrk="0" fontAlgn="base" latinLnBrk="0" hangingPunct="0">
+              <a:lnSpc>
+                <a:spcPct val="100000"/>
+              </a:lnSpc>
+              <a:spcBef>
+                <a:spcPct val="0"/>
+              </a:spcBef>
+              <a:spcAft>
+                <a:spcPct val="0"/>
+              </a:spcAft>
+              <a:buClrTx/>
+              <a:buSzTx/>
+              <a:buFontTx/>
+              <a:buNone/>
+              <a:tabLst/>
+            </a:pPr>
             <a:r>
               <a:rPr kumimoji="0" lang="en-US" altLang="en-US" sz="1000" b="0" i="1" u="none" strike="noStrike" cap="none" normalizeH="0" baseline="0" dirty="0">
                 <a:ln>
@@ -16137,18 +16150,24 @@
               </a:rPr>
               <a:t>// Implemented in Java</a:t>
             </a:r>
-            <a:br>
-              <a:rPr kumimoji="0" lang="en-US" altLang="en-US" sz="1000" b="0" i="1" u="none" strike="noStrike" cap="none" normalizeH="0" baseline="0" dirty="0">
-                <a:ln>
-                  <a:noFill/>
-                </a:ln>
-                <a:solidFill>
-                  <a:srgbClr val="808080"/>
-                </a:solidFill>
-                <a:effectLst/>
-                <a:latin typeface="Consolas" panose="020B0609020204030204" pitchFamily="49" charset="0"/>
-              </a:rPr>
-            </a:br>
+          </a:p>
+          <a:p>
+            <a:pPr marL="0" marR="0" lvl="0" indent="0" algn="l" defTabSz="914400" rtl="0" eaLnBrk="0" fontAlgn="base" latinLnBrk="0" hangingPunct="0">
+              <a:lnSpc>
+                <a:spcPct val="100000"/>
+              </a:lnSpc>
+              <a:spcBef>
+                <a:spcPct val="0"/>
+              </a:spcBef>
+              <a:spcAft>
+                <a:spcPct val="0"/>
+              </a:spcAft>
+              <a:buClrTx/>
+              <a:buSzTx/>
+              <a:buFontTx/>
+              <a:buNone/>
+              <a:tabLst/>
+            </a:pPr>
             <a:r>
               <a:rPr kumimoji="0" lang="en-US" altLang="en-US" sz="1000" b="0" i="0" u="none" strike="noStrike" cap="none" normalizeH="0" baseline="0" dirty="0">
                 <a:ln>
@@ -16173,237 +16192,7 @@
                 <a:effectLst/>
                 <a:latin typeface="Consolas" panose="020B0609020204030204" pitchFamily="49" charset="0"/>
               </a:rPr>
-              <a:t>function2() \</a:t>
-            </a:r>
-            <a:br>
-              <a:rPr kumimoji="0" lang="en-US" altLang="en-US" sz="1000" b="0" i="0" u="none" strike="noStrike" cap="none" normalizeH="0" baseline="0" dirty="0">
-                <a:ln>
-                  <a:noFill/>
-                </a:ln>
-                <a:solidFill>
-                  <a:srgbClr val="080808"/>
-                </a:solidFill>
-                <a:effectLst/>
-                <a:latin typeface="Consolas" panose="020B0609020204030204" pitchFamily="49" charset="0"/>
-              </a:rPr>
-            </a:br>
-            <a:r>
-              <a:rPr kumimoji="0" lang="en-US" altLang="en-US" sz="1000" b="0" i="0" u="none" strike="noStrike" cap="none" normalizeH="0" baseline="0" dirty="0">
-                <a:ln>
-                  <a:noFill/>
-                </a:ln>
-                <a:solidFill>
-                  <a:srgbClr val="080808"/>
-                </a:solidFill>
-                <a:effectLst/>
-                <a:latin typeface="Consolas" panose="020B0609020204030204" pitchFamily="49" charset="0"/>
-              </a:rPr>
-              <a:t>    __attribute__(( \</a:t>
-            </a:r>
-            <a:br>
-              <a:rPr kumimoji="0" lang="en-US" altLang="en-US" sz="1000" b="0" i="0" u="none" strike="noStrike" cap="none" normalizeH="0" baseline="0" dirty="0">
-                <a:ln>
-                  <a:noFill/>
-                </a:ln>
-                <a:solidFill>
-                  <a:srgbClr val="080808"/>
-                </a:solidFill>
-                <a:effectLst/>
-                <a:latin typeface="Consolas" panose="020B0609020204030204" pitchFamily="49" charset="0"/>
-              </a:rPr>
-            </a:br>
-            <a:r>
-              <a:rPr kumimoji="0" lang="en-US" altLang="en-US" sz="1000" b="0" i="0" u="none" strike="noStrike" cap="none" normalizeH="0" baseline="0" dirty="0">
-                <a:ln>
-                  <a:noFill/>
-                </a:ln>
-                <a:solidFill>
-                  <a:srgbClr val="080808"/>
-                </a:solidFill>
-                <a:effectLst/>
-                <a:latin typeface="Consolas" panose="020B0609020204030204" pitchFamily="49" charset="0"/>
-              </a:rPr>
-              <a:t>    __</a:t>
-            </a:r>
-            <a:r>
-              <a:rPr kumimoji="0" lang="en-US" altLang="en-US" sz="1000" b="0" i="0" u="none" strike="noStrike" cap="none" normalizeH="0" baseline="0" dirty="0" err="1">
-                <a:ln>
-                  <a:noFill/>
-                </a:ln>
-                <a:solidFill>
-                  <a:srgbClr val="080808"/>
-                </a:solidFill>
-                <a:effectLst/>
-                <a:latin typeface="Consolas" panose="020B0609020204030204" pitchFamily="49" charset="0"/>
-              </a:rPr>
-              <a:t>import_module</a:t>
-            </a:r>
-            <a:r>
-              <a:rPr kumimoji="0" lang="en-US" altLang="en-US" sz="1000" b="0" i="0" u="none" strike="noStrike" cap="none" normalizeH="0" baseline="0" dirty="0">
-                <a:ln>
-                  <a:noFill/>
-                </a:ln>
-                <a:solidFill>
-                  <a:srgbClr val="080808"/>
-                </a:solidFill>
-                <a:effectLst/>
-                <a:latin typeface="Consolas" panose="020B0609020204030204" pitchFamily="49" charset="0"/>
-              </a:rPr>
-              <a:t>__(</a:t>
-            </a:r>
-            <a:r>
-              <a:rPr kumimoji="0" lang="en-US" altLang="en-US" sz="1000" b="0" i="0" u="none" strike="noStrike" cap="none" normalizeH="0" baseline="0" dirty="0">
-                <a:ln>
-                  <a:noFill/>
-                </a:ln>
-                <a:solidFill>
-                  <a:srgbClr val="067D17"/>
-                </a:solidFill>
-                <a:effectLst/>
-                <a:latin typeface="Consolas" panose="020B0609020204030204" pitchFamily="49" charset="0"/>
-              </a:rPr>
-              <a:t>“</a:t>
-            </a:r>
-            <a:r>
-              <a:rPr kumimoji="0" lang="en-US" altLang="en-US" sz="1000" b="0" i="0" u="none" strike="noStrike" cap="none" normalizeH="0" baseline="0" dirty="0" err="1">
-                <a:ln>
-                  <a:noFill/>
-                </a:ln>
-                <a:solidFill>
-                  <a:srgbClr val="067D17"/>
-                </a:solidFill>
-                <a:effectLst/>
-                <a:latin typeface="Consolas" panose="020B0609020204030204" pitchFamily="49" charset="0"/>
-              </a:rPr>
-              <a:t>example.JavaCode</a:t>
-            </a:r>
-            <a:r>
-              <a:rPr kumimoji="0" lang="en-US" altLang="en-US" sz="1000" b="0" i="0" u="none" strike="noStrike" cap="none" normalizeH="0" baseline="0" dirty="0">
-                <a:ln>
-                  <a:noFill/>
-                </a:ln>
-                <a:solidFill>
-                  <a:srgbClr val="067D17"/>
-                </a:solidFill>
-                <a:effectLst/>
-                <a:latin typeface="Consolas" panose="020B0609020204030204" pitchFamily="49" charset="0"/>
-              </a:rPr>
-              <a:t>"</a:t>
-            </a:r>
-            <a:r>
-              <a:rPr kumimoji="0" lang="en-US" altLang="en-US" sz="1000" b="0" i="0" u="none" strike="noStrike" cap="none" normalizeH="0" baseline="0" dirty="0">
-                <a:ln>
-                  <a:noFill/>
-                </a:ln>
-                <a:solidFill>
-                  <a:srgbClr val="080808"/>
-                </a:solidFill>
-                <a:effectLst/>
-                <a:latin typeface="Consolas" panose="020B0609020204030204" pitchFamily="49" charset="0"/>
-              </a:rPr>
-              <a:t>), \</a:t>
-            </a:r>
-            <a:br>
-              <a:rPr kumimoji="0" lang="en-US" altLang="en-US" sz="1000" b="0" i="0" u="none" strike="noStrike" cap="none" normalizeH="0" baseline="0" dirty="0">
-                <a:ln>
-                  <a:noFill/>
-                </a:ln>
-                <a:solidFill>
-                  <a:srgbClr val="080808"/>
-                </a:solidFill>
-                <a:effectLst/>
-                <a:latin typeface="Consolas" panose="020B0609020204030204" pitchFamily="49" charset="0"/>
-              </a:rPr>
-            </a:br>
-            <a:r>
-              <a:rPr kumimoji="0" lang="en-US" altLang="en-US" sz="1000" b="0" i="0" u="none" strike="noStrike" cap="none" normalizeH="0" baseline="0" dirty="0">
-                <a:ln>
-                  <a:noFill/>
-                </a:ln>
-                <a:solidFill>
-                  <a:srgbClr val="080808"/>
-                </a:solidFill>
-                <a:effectLst/>
-                <a:latin typeface="Consolas" panose="020B0609020204030204" pitchFamily="49" charset="0"/>
-              </a:rPr>
-              <a:t>    __</a:t>
-            </a:r>
-            <a:r>
-              <a:rPr kumimoji="0" lang="en-US" altLang="en-US" sz="1000" b="0" i="0" u="none" strike="noStrike" cap="none" normalizeH="0" baseline="0" dirty="0" err="1">
-                <a:ln>
-                  <a:noFill/>
-                </a:ln>
-                <a:solidFill>
-                  <a:srgbClr val="080808"/>
-                </a:solidFill>
-                <a:effectLst/>
-                <a:latin typeface="Consolas" panose="020B0609020204030204" pitchFamily="49" charset="0"/>
-              </a:rPr>
-              <a:t>import_name</a:t>
-            </a:r>
-            <a:r>
-              <a:rPr kumimoji="0" lang="en-US" altLang="en-US" sz="1000" b="0" i="0" u="none" strike="noStrike" cap="none" normalizeH="0" baseline="0" dirty="0">
-                <a:ln>
-                  <a:noFill/>
-                </a:ln>
-                <a:solidFill>
-                  <a:srgbClr val="080808"/>
-                </a:solidFill>
-                <a:effectLst/>
-                <a:latin typeface="Consolas" panose="020B0609020204030204" pitchFamily="49" charset="0"/>
-              </a:rPr>
-              <a:t>__(</a:t>
-            </a:r>
-            <a:r>
-              <a:rPr kumimoji="0" lang="en-US" altLang="en-US" sz="1000" b="0" i="0" u="none" strike="noStrike" cap="none" normalizeH="0" baseline="0" dirty="0">
-                <a:ln>
-                  <a:noFill/>
-                </a:ln>
-                <a:solidFill>
-                  <a:srgbClr val="067D17"/>
-                </a:solidFill>
-                <a:effectLst/>
-                <a:latin typeface="Consolas" panose="020B0609020204030204" pitchFamily="49" charset="0"/>
-              </a:rPr>
-              <a:t>"method2"</a:t>
-            </a:r>
-            <a:r>
-              <a:rPr kumimoji="0" lang="en-US" altLang="en-US" sz="1000" b="0" i="0" u="none" strike="noStrike" cap="none" normalizeH="0" baseline="0" dirty="0">
-                <a:ln>
-                  <a:noFill/>
-                </a:ln>
-                <a:solidFill>
-                  <a:srgbClr val="080808"/>
-                </a:solidFill>
-                <a:effectLst/>
-                <a:latin typeface="Consolas" panose="020B0609020204030204" pitchFamily="49" charset="0"/>
-              </a:rPr>
-              <a:t>)) \</a:t>
-            </a:r>
-            <a:br>
-              <a:rPr kumimoji="0" lang="en-US" altLang="en-US" sz="1000" b="0" i="0" u="none" strike="noStrike" cap="none" normalizeH="0" baseline="0" dirty="0">
-                <a:ln>
-                  <a:noFill/>
-                </a:ln>
-                <a:solidFill>
-                  <a:srgbClr val="080808"/>
-                </a:solidFill>
-                <a:effectLst/>
-                <a:latin typeface="Consolas" panose="020B0609020204030204" pitchFamily="49" charset="0"/>
-              </a:rPr>
-            </a:br>
-            <a:r>
-              <a:rPr kumimoji="0" lang="en-US" altLang="en-US" sz="1000" b="0" i="0" u="none" strike="noStrike" cap="none" normalizeH="0" baseline="0" dirty="0">
-                <a:ln>
-                  <a:noFill/>
-                </a:ln>
-                <a:solidFill>
-                  <a:srgbClr val="080808"/>
-                </a:solidFill>
-                <a:effectLst/>
-                <a:latin typeface="Consolas" panose="020B0609020204030204" pitchFamily="49" charset="0"/>
-              </a:rPr>
-              <a:t>    );</a:t>
+              <a:t>function2();</a:t>
             </a:r>
             <a:br>
               <a:rPr kumimoji="0" lang="en-US" altLang="en-US" sz="1000" b="0" i="0" u="none" strike="noStrike" cap="none" normalizeH="0" baseline="0" dirty="0">
@@ -16485,6 +16274,82 @@
               <a:buNone/>
               <a:tabLst/>
             </a:pPr>
+            <a:endParaRPr lang="en-US" altLang="en-US" sz="1000" i="1" dirty="0">
+              <a:solidFill>
+                <a:srgbClr val="808080"/>
+              </a:solidFill>
+              <a:latin typeface="Consolas" panose="020B0609020204030204" pitchFamily="49" charset="0"/>
+            </a:endParaRPr>
+          </a:p>
+          <a:p>
+            <a:pPr marL="0" marR="0" lvl="0" indent="0" algn="l" defTabSz="914400" rtl="0" eaLnBrk="0" fontAlgn="base" latinLnBrk="0" hangingPunct="0">
+              <a:lnSpc>
+                <a:spcPct val="100000"/>
+              </a:lnSpc>
+              <a:spcBef>
+                <a:spcPct val="0"/>
+              </a:spcBef>
+              <a:spcAft>
+                <a:spcPct val="0"/>
+              </a:spcAft>
+              <a:buClrTx/>
+              <a:buSzTx/>
+              <a:buFontTx/>
+              <a:buNone/>
+              <a:tabLst/>
+            </a:pPr>
+            <a:endParaRPr kumimoji="0" lang="en-US" altLang="en-US" sz="1000" b="0" i="1" u="none" strike="noStrike" cap="none" normalizeH="0" baseline="0" dirty="0">
+              <a:ln>
+                <a:noFill/>
+              </a:ln>
+              <a:solidFill>
+                <a:srgbClr val="808080"/>
+              </a:solidFill>
+              <a:effectLst/>
+              <a:latin typeface="Consolas" panose="020B0609020204030204" pitchFamily="49" charset="0"/>
+            </a:endParaRPr>
+          </a:p>
+          <a:p>
+            <a:pPr marL="0" marR="0" lvl="0" indent="0" algn="l" defTabSz="914400" rtl="0" eaLnBrk="0" fontAlgn="base" latinLnBrk="0" hangingPunct="0">
+              <a:lnSpc>
+                <a:spcPct val="100000"/>
+              </a:lnSpc>
+              <a:spcBef>
+                <a:spcPct val="0"/>
+              </a:spcBef>
+              <a:spcAft>
+                <a:spcPct val="0"/>
+              </a:spcAft>
+              <a:buClrTx/>
+              <a:buSzTx/>
+              <a:buFontTx/>
+              <a:buNone/>
+              <a:tabLst/>
+            </a:pPr>
+            <a:endParaRPr lang="en-US" altLang="en-US" sz="1000" i="1" dirty="0">
+              <a:solidFill>
+                <a:srgbClr val="808080"/>
+              </a:solidFill>
+              <a:latin typeface="Consolas" panose="020B0609020204030204" pitchFamily="49" charset="0"/>
+            </a:endParaRPr>
+          </a:p>
+          <a:p>
+            <a:pPr marL="0" marR="0" lvl="0" indent="0" algn="l" defTabSz="914400" rtl="0" eaLnBrk="0" fontAlgn="base" latinLnBrk="0" hangingPunct="0">
+              <a:lnSpc>
+                <a:spcPct val="100000"/>
+              </a:lnSpc>
+              <a:spcBef>
+                <a:spcPct val="0"/>
+              </a:spcBef>
+              <a:spcAft>
+                <a:spcPct val="0"/>
+              </a:spcAft>
+              <a:buClrTx/>
+              <a:buSzTx/>
+              <a:buFontTx/>
+              <a:buNone/>
+              <a:tabLst/>
+            </a:pPr>
             <a:r>
               <a:rPr kumimoji="0" lang="en-US" altLang="en-US" sz="1000" b="0" i="1" u="none" strike="noStrike" cap="none" normalizeH="0" baseline="0" dirty="0">
                 <a:ln>
@@ -16613,7 +16478,7 @@
         </p:nvSpPr>
         <p:spPr>
           <a:xfrm>
-            <a:off x="570214" y="938675"/>
+            <a:off x="664233" y="869667"/>
             <a:ext cx="6094562" cy="369332"/>
           </a:xfrm>
           <a:prstGeom prst="rect">
@@ -16628,7 +16493,7 @@
           <a:lstStyle/>
           <a:p>
             <a:r>
-              <a:rPr lang="en-US" altLang="en-US" dirty="0" err="1">
+              <a:rPr lang="en-US" altLang="en-US" dirty="0">
                 <a:solidFill>
                   <a:srgbClr val="000000"/>
                 </a:solidFill>
@@ -16637,7 +16502,7 @@
               <a:t>example</a:t>
             </a:r>
             <a:r>
-              <a:rPr kumimoji="0" lang="en-US" altLang="en-US" sz="1800" b="0" i="0" u="none" strike="noStrike" cap="none" normalizeH="0" baseline="0" dirty="0" err="1">
+              <a:rPr kumimoji="0" lang="en-US" altLang="en-US" sz="1800" b="0" i="0" u="none" strike="noStrike" cap="none" normalizeH="0" baseline="0" dirty="0">
                 <a:ln>
                   <a:noFill/>
                 </a:ln>
@@ -16647,7 +16512,7 @@
                 <a:effectLst/>
                 <a:latin typeface="Consolas" panose="020B0609020204030204" pitchFamily="49" charset="0"/>
               </a:rPr>
-              <a:t>.JavaCode</a:t>
+              <a:t>/JavaCode.java</a:t>
             </a:r>
             <a:endParaRPr lang="en-US" dirty="0"/>
           </a:p>
@@ -16667,7 +16532,7 @@
         </p:nvSpPr>
         <p:spPr>
           <a:xfrm>
-            <a:off x="5887246" y="938675"/>
+            <a:off x="5887246" y="869667"/>
             <a:ext cx="3212030" cy="369332"/>
           </a:xfrm>
           <a:prstGeom prst="rect">
@@ -16715,8 +16580,8 @@
         </p:nvCxnSpPr>
         <p:spPr>
           <a:xfrm>
-            <a:off x="2927562" y="4116144"/>
-            <a:ext cx="2912114" cy="0"/>
+            <a:off x="4675517" y="4280046"/>
+            <a:ext cx="1211729" cy="0"/>
           </a:xfrm>
           <a:prstGeom prst="straightConnector1">
             <a:avLst/>
@@ -16756,8 +16621,8 @@
         </p:nvCxnSpPr>
         <p:spPr>
           <a:xfrm flipH="1">
-            <a:off x="4011283" y="3061775"/>
-            <a:ext cx="1828393" cy="0"/>
+            <a:off x="4192438" y="3061775"/>
+            <a:ext cx="1647238" cy="0"/>
           </a:xfrm>
           <a:prstGeom prst="straightConnector1">
             <a:avLst/>
@@ -16795,8 +16660,8 @@
         </p:nvSpPr>
         <p:spPr>
           <a:xfrm>
-            <a:off x="3957503" y="3888646"/>
-            <a:ext cx="801501" cy="215444"/>
+            <a:off x="4759648" y="4074379"/>
+            <a:ext cx="886461" cy="184666"/>
           </a:xfrm>
           <a:prstGeom prst="rect">
             <a:avLst/>
@@ -16818,7 +16683,7 @@
               </a:spcAft>
             </a:pPr>
             <a:r>
-              <a:rPr lang="en-US" sz="1400" b="1" i="0" spc="0" dirty="0">
+              <a:rPr lang="en-US" sz="1200" b="1" i="0" spc="0" dirty="0">
                 <a:ln>
                   <a:noFill/>
                 </a:ln>
@@ -16829,7 +16694,7 @@
                 <a:ea typeface="Source Sans Pro Light" charset="0"/>
                 <a:cs typeface="Source Sans Pro Light" charset="0"/>
               </a:rPr>
-              <a:t>mapped to</a:t>
+              <a:t>Bind Java to C</a:t>
             </a:r>
           </a:p>
         </p:txBody>
@@ -16851,7 +16716,7 @@
         <p:spPr>
           <a:xfrm>
             <a:off x="5671914" y="664623"/>
-            <a:ext cx="0" cy="5254702"/>
+            <a:ext cx="0" cy="5054690"/>
           </a:xfrm>
           <a:prstGeom prst="line">
             <a:avLst/>
@@ -17017,8 +16882,8 @@
         </p:nvSpPr>
         <p:spPr>
           <a:xfrm>
-            <a:off x="4729090" y="2833683"/>
-            <a:ext cx="801501" cy="215444"/>
+            <a:off x="4759648" y="2877109"/>
+            <a:ext cx="886461" cy="184666"/>
           </a:xfrm>
           <a:prstGeom prst="rect">
             <a:avLst/>
@@ -17040,7 +16905,7 @@
               </a:spcAft>
             </a:pPr>
             <a:r>
-              <a:rPr lang="en-US" sz="1400" b="1" i="0" spc="0" dirty="0">
+              <a:rPr lang="en-US" sz="1200" b="1" i="0" spc="0" dirty="0">
                 <a:ln>
                   <a:noFill/>
                 </a:ln>
@@ -17051,7 +16916,7 @@
                 <a:ea typeface="Source Sans Pro Light" charset="0"/>
                 <a:cs typeface="Source Sans Pro Light" charset="0"/>
               </a:rPr>
-              <a:t>mapped to</a:t>
+              <a:t>Bind C to Java</a:t>
             </a:r>
           </a:p>
         </p:txBody>

</xml_diff>

<commit_message>
fix call stack and double quote character
</commit_message>
<xml_diff>
--- a/ApplicationDeveloperGuide/images/managedc-communication.pptx
+++ b/ApplicationDeveloperGuide/images/managedc-communication.pptx
@@ -219,7 +219,7 @@
               <a:rPr lang="fr-FR" smtClean="0">
                 <a:latin typeface="Calibri Regular" charset="0"/>
               </a:rPr>
-              <a:t>vendredi 17 janvier 2025</a:t>
+              <a:t>mardi 21 janvier 2025</a:t>
             </a:fld>
             <a:endParaRPr lang="en-US" dirty="0">
               <a:latin typeface="Calibri Regular" charset="0"/>
@@ -397,7 +397,7 @@
           <a:p>
             <a:fld id="{885721CF-495B-2B41-A23A-4D3221F80235}" type="datetime2">
               <a:rPr lang="fr-FR" smtClean="0"/>
-              <a:t>vendredi 17 janvier 2025</a:t>
+              <a:t>mardi 21 janvier 2025</a:t>
             </a:fld>
             <a:endParaRPr lang="en-US" dirty="0"/>
           </a:p>
@@ -14971,7 +14971,7 @@
                 <a:effectLst/>
                 <a:latin typeface="Consolas" panose="020B0609020204030204" pitchFamily="49" charset="0"/>
               </a:rPr>
-              <a:t>“c_code"</a:t>
+              <a:t>"c_code"</a:t>
             </a:r>
             <a:r>
               <a:rPr kumimoji="0" lang="en-US" altLang="en-US" sz="1000" b="0" i="0" u="none" strike="noStrike" cap="none" normalizeH="0" baseline="0" dirty="0">
@@ -15864,8 +15864,8 @@
         </p:nvSpPr>
         <p:spPr bwMode="auto">
           <a:xfrm>
-            <a:off x="5861310" y="1395375"/>
-            <a:ext cx="3386205" cy="3477875"/>
+            <a:off x="5861311" y="1395375"/>
+            <a:ext cx="1876582" cy="3477875"/>
           </a:xfrm>
           <a:prstGeom prst="rect">
             <a:avLst/>
@@ -17850,7 +17850,7 @@
                 <a:ea typeface="Source Sans Pro Light" charset="0"/>
                 <a:cs typeface="Source Sans Pro Light" charset="0"/>
               </a:rPr>
-              <a:t>method2</a:t>
+              <a:t>function2</a:t>
             </a:r>
           </a:p>
         </p:txBody>

</xml_diff>

<commit_message>
document the trap behavior
</commit_message>
<xml_diff>
--- a/ApplicationDeveloperGuide/images/managedc-communication.pptx
+++ b/ApplicationDeveloperGuide/images/managedc-communication.pptx
@@ -5,14 +5,15 @@
     <p:sldMasterId id="2147483660" r:id="rId1"/>
   </p:sldMasterIdLst>
   <p:notesMasterIdLst>
-    <p:notesMasterId r:id="rId4"/>
+    <p:notesMasterId r:id="rId5"/>
   </p:notesMasterIdLst>
   <p:handoutMasterIdLst>
-    <p:handoutMasterId r:id="rId5"/>
+    <p:handoutMasterId r:id="rId6"/>
   </p:handoutMasterIdLst>
   <p:sldIdLst>
     <p:sldId id="256" r:id="rId2"/>
     <p:sldId id="257" r:id="rId3"/>
+    <p:sldId id="258" r:id="rId4"/>
   </p:sldIdLst>
   <p:sldSz cx="12192000" cy="6858000"/>
   <p:notesSz cx="6858000" cy="9144000"/>
@@ -219,7 +220,7 @@
               <a:rPr lang="fr-FR" smtClean="0">
                 <a:latin typeface="Calibri Regular" charset="0"/>
               </a:rPr>
-              <a:t>mardi 21 janvier 2025</a:t>
+              <a:t>jeudi 12 juin 2025</a:t>
             </a:fld>
             <a:endParaRPr lang="en-US" dirty="0">
               <a:latin typeface="Calibri Regular" charset="0"/>
@@ -397,7 +398,7 @@
           <a:p>
             <a:fld id="{885721CF-495B-2B41-A23A-4D3221F80235}" type="datetime2">
               <a:rPr lang="fr-FR" smtClean="0"/>
-              <a:t>mardi 21 janvier 2025</a:t>
+              <a:t>jeudi 12 juin 2025</a:t>
             </a:fld>
             <a:endParaRPr lang="en-US" dirty="0"/>
           </a:p>
@@ -18152,6 +18153,1933 @@
     <p:extLst>
       <p:ext uri="{BB962C8B-B14F-4D97-AF65-F5344CB8AC3E}">
         <p14:creationId xmlns:p14="http://schemas.microsoft.com/office/powerpoint/2010/main" val="2425184397"/>
+      </p:ext>
+    </p:extLst>
+  </p:cSld>
+  <p:clrMapOvr>
+    <a:masterClrMapping/>
+  </p:clrMapOvr>
+</p:sld>
+</file>
+
+<file path=ppt/slides/slide3.xml><?xml version="1.0" encoding="utf-8"?>
+<p:sld xmlns:a="http://schemas.openxmlformats.org/drawingml/2006/main" xmlns:r="http://schemas.openxmlformats.org/officeDocument/2006/relationships" xmlns:p="http://schemas.openxmlformats.org/presentationml/2006/main">
+  <p:cSld>
+    <p:spTree>
+      <p:nvGrpSpPr>
+        <p:cNvPr id="1" name="">
+          <a:extLst>
+            <a:ext uri="{FF2B5EF4-FFF2-40B4-BE49-F238E27FC236}">
+              <a16:creationId xmlns:a16="http://schemas.microsoft.com/office/drawing/2014/main" id="{A7E9F0FD-B016-974D-ADDC-479D2F4B5EDC}"/>
+            </a:ext>
+          </a:extLst>
+        </p:cNvPr>
+        <p:cNvGrpSpPr/>
+        <p:nvPr/>
+      </p:nvGrpSpPr>
+      <p:grpSpPr>
+        <a:xfrm>
+          <a:off x="0" y="0"/>
+          <a:ext cx="0" cy="0"/>
+          <a:chOff x="0" y="0"/>
+          <a:chExt cx="0" cy="0"/>
+        </a:xfrm>
+      </p:grpSpPr>
+      <p:sp>
+        <p:nvSpPr>
+          <p:cNvPr id="2" name="Date Placeholder 1">
+            <a:extLst>
+              <a:ext uri="{FF2B5EF4-FFF2-40B4-BE49-F238E27FC236}">
+                <a16:creationId xmlns:a16="http://schemas.microsoft.com/office/drawing/2014/main" id="{1707B219-3B3A-F2BE-F460-85F599612999}"/>
+              </a:ext>
+            </a:extLst>
+          </p:cNvPr>
+          <p:cNvSpPr>
+            <a:spLocks noGrp="1"/>
+          </p:cNvSpPr>
+          <p:nvPr>
+            <p:ph type="dt" sz="half" idx="10"/>
+          </p:nvPr>
+        </p:nvSpPr>
+        <p:spPr/>
+        <p:txBody>
+          <a:bodyPr/>
+          <a:lstStyle/>
+          <a:p>
+            <a:r>
+              <a:rPr lang="en-US"/>
+              <a:t>Vx.y Jan. 2024</a:t>
+            </a:r>
+            <a:endParaRPr lang="en-US" dirty="0"/>
+          </a:p>
+        </p:txBody>
+      </p:sp>
+      <p:sp>
+        <p:nvSpPr>
+          <p:cNvPr id="3" name="Footer Placeholder 2">
+            <a:extLst>
+              <a:ext uri="{FF2B5EF4-FFF2-40B4-BE49-F238E27FC236}">
+                <a16:creationId xmlns:a16="http://schemas.microsoft.com/office/drawing/2014/main" id="{579CD484-D516-29A2-2BF6-61CF6461E013}"/>
+              </a:ext>
+            </a:extLst>
+          </p:cNvPr>
+          <p:cNvSpPr>
+            <a:spLocks noGrp="1"/>
+          </p:cNvSpPr>
+          <p:nvPr>
+            <p:ph type="ftr" sz="quarter" idx="11"/>
+          </p:nvPr>
+        </p:nvSpPr>
+        <p:spPr/>
+        <p:txBody>
+          <a:bodyPr/>
+          <a:lstStyle/>
+          <a:p>
+            <a:r>
+              <a:rPr lang="en-US"/>
+              <a:t>© MICROEJ 2024 - PUBLIC (leave blank) | INTERNAL USE | RESTRICTED &lt;COMPANY or Persons&gt;| CONFIDENTIAL | SECRET</a:t>
+            </a:r>
+            <a:endParaRPr lang="en-US" dirty="0"/>
+          </a:p>
+        </p:txBody>
+      </p:sp>
+      <p:sp>
+        <p:nvSpPr>
+          <p:cNvPr id="17" name="Round Same Side Corner Rectangle 101">
+            <a:extLst>
+              <a:ext uri="{FF2B5EF4-FFF2-40B4-BE49-F238E27FC236}">
+                <a16:creationId xmlns:a16="http://schemas.microsoft.com/office/drawing/2014/main" id="{6D5E489E-8BB8-579D-B80A-6817CD260E20}"/>
+              </a:ext>
+            </a:extLst>
+          </p:cNvPr>
+          <p:cNvSpPr/>
+          <p:nvPr/>
+        </p:nvSpPr>
+        <p:spPr>
+          <a:xfrm rot="10800000">
+            <a:off x="2900348" y="4275761"/>
+            <a:ext cx="2025335" cy="1219087"/>
+          </a:xfrm>
+          <a:prstGeom prst="round2SameRect">
+            <a:avLst>
+              <a:gd name="adj1" fmla="val 9357"/>
+              <a:gd name="adj2" fmla="val 0"/>
+            </a:avLst>
+          </a:prstGeom>
+          <a:gradFill>
+            <a:gsLst>
+              <a:gs pos="57000">
+                <a:srgbClr val="EE502E"/>
+              </a:gs>
+              <a:gs pos="100000">
+                <a:srgbClr val="717D83"/>
+              </a:gs>
+            </a:gsLst>
+            <a:lin ang="16200000" scaled="0"/>
+          </a:gradFill>
+          <a:ln w="12700" cap="flat" cmpd="sng" algn="ctr">
+            <a:noFill/>
+            <a:prstDash val="solid"/>
+          </a:ln>
+          <a:effectLst/>
+        </p:spPr>
+        <p:txBody>
+          <a:bodyPr rtlCol="0" anchor="ctr"/>
+          <a:lstStyle/>
+          <a:p>
+            <a:pPr marL="0" marR="0" lvl="0" indent="0" algn="ctr" defTabSz="914377" eaLnBrk="1" fontAlgn="auto" latinLnBrk="0" hangingPunct="1">
+              <a:lnSpc>
+                <a:spcPct val="100000"/>
+              </a:lnSpc>
+              <a:spcBef>
+                <a:spcPts val="0"/>
+              </a:spcBef>
+              <a:spcAft>
+                <a:spcPts val="0"/>
+              </a:spcAft>
+              <a:buClrTx/>
+              <a:buSzTx/>
+              <a:buFontTx/>
+              <a:buNone/>
+              <a:tabLst/>
+              <a:defRPr/>
+            </a:pPr>
+            <a:endParaRPr kumimoji="0" lang="en-US" sz="1600" b="0" i="0" u="none" strike="noStrike" kern="0" cap="none" spc="0" normalizeH="0" baseline="0" noProof="0" dirty="0">
+              <a:ln w="0">
+                <a:solidFill>
+                  <a:sysClr val="windowText" lastClr="000000"/>
+                </a:solidFill>
+              </a:ln>
+              <a:solidFill>
+                <a:srgbClr val="4B5357"/>
+              </a:solidFill>
+              <a:effectLst/>
+              <a:uLnTx/>
+              <a:uFillTx/>
+              <a:latin typeface="Calibri Light"/>
+              <a:ea typeface="+mn-ea"/>
+              <a:cs typeface="+mn-cs"/>
+            </a:endParaRPr>
+          </a:p>
+        </p:txBody>
+      </p:sp>
+      <p:grpSp>
+        <p:nvGrpSpPr>
+          <p:cNvPr id="18" name="Group 17">
+            <a:extLst>
+              <a:ext uri="{FF2B5EF4-FFF2-40B4-BE49-F238E27FC236}">
+                <a16:creationId xmlns:a16="http://schemas.microsoft.com/office/drawing/2014/main" id="{05412B00-BF67-ACBD-36D8-BE7D850E889F}"/>
+              </a:ext>
+            </a:extLst>
+          </p:cNvPr>
+          <p:cNvGrpSpPr/>
+          <p:nvPr/>
+        </p:nvGrpSpPr>
+        <p:grpSpPr>
+          <a:xfrm>
+            <a:off x="3331799" y="5075232"/>
+            <a:ext cx="1162432" cy="359571"/>
+            <a:chOff x="3671478" y="3950249"/>
+            <a:chExt cx="1308417" cy="404729"/>
+          </a:xfrm>
+        </p:grpSpPr>
+        <p:sp>
+          <p:nvSpPr>
+            <p:cNvPr id="19" name="Rounded Rectangle 79">
+              <a:extLst>
+                <a:ext uri="{FF2B5EF4-FFF2-40B4-BE49-F238E27FC236}">
+                  <a16:creationId xmlns:a16="http://schemas.microsoft.com/office/drawing/2014/main" id="{9F5D165B-3BB5-D1AE-3D98-24616ED37ACC}"/>
+                </a:ext>
+              </a:extLst>
+            </p:cNvPr>
+            <p:cNvSpPr/>
+            <p:nvPr/>
+          </p:nvSpPr>
+          <p:spPr>
+            <a:xfrm>
+              <a:off x="3671478" y="3950249"/>
+              <a:ext cx="1305271" cy="404729"/>
+            </a:xfrm>
+            <a:prstGeom prst="roundRect">
+              <a:avLst>
+                <a:gd name="adj" fmla="val 12736"/>
+              </a:avLst>
+            </a:prstGeom>
+            <a:solidFill>
+              <a:srgbClr val="FFFFFF"/>
+            </a:solidFill>
+            <a:ln w="12700" cap="flat" cmpd="sng" algn="ctr">
+              <a:noFill/>
+              <a:prstDash val="solid"/>
+            </a:ln>
+            <a:effectLst/>
+          </p:spPr>
+          <p:txBody>
+            <a:bodyPr wrap="square" tIns="36000" bIns="36000" rtlCol="0" anchor="ctr">
+              <a:noAutofit/>
+            </a:bodyPr>
+            <a:lstStyle/>
+            <a:p>
+              <a:pPr marL="0" marR="0" lvl="0" indent="0" defTabSz="914377" eaLnBrk="1" fontAlgn="auto" latinLnBrk="0" hangingPunct="1">
+                <a:lnSpc>
+                  <a:spcPct val="100000"/>
+                </a:lnSpc>
+                <a:spcBef>
+                  <a:spcPts val="0"/>
+                </a:spcBef>
+                <a:spcAft>
+                  <a:spcPts val="0"/>
+                </a:spcAft>
+                <a:buClrTx/>
+                <a:buSzTx/>
+                <a:buFontTx/>
+                <a:buNone/>
+                <a:tabLst/>
+                <a:defRPr/>
+              </a:pPr>
+              <a:endParaRPr kumimoji="0" lang="en-US" sz="1200" b="0" i="0" u="none" strike="noStrike" kern="0" cap="none" spc="0" normalizeH="0" baseline="0" noProof="0" dirty="0">
+                <a:ln>
+                  <a:noFill/>
+                </a:ln>
+                <a:solidFill>
+                  <a:srgbClr val="FFFFFF"/>
+                </a:solidFill>
+                <a:effectLst/>
+                <a:uLnTx/>
+                <a:uFillTx/>
+                <a:latin typeface="Source Sans Pro Light" charset="0"/>
+                <a:ea typeface="Source Sans Pro Light" charset="0"/>
+                <a:cs typeface="Source Sans Pro Light" charset="0"/>
+              </a:endParaRPr>
+            </a:p>
+          </p:txBody>
+        </p:sp>
+        <p:grpSp>
+          <p:nvGrpSpPr>
+            <p:cNvPr id="20" name="Group 19">
+              <a:extLst>
+                <a:ext uri="{FF2B5EF4-FFF2-40B4-BE49-F238E27FC236}">
+                  <a16:creationId xmlns:a16="http://schemas.microsoft.com/office/drawing/2014/main" id="{37055576-9E01-E6EC-481D-F3467DA0BCDF}"/>
+                </a:ext>
+              </a:extLst>
+            </p:cNvPr>
+            <p:cNvGrpSpPr/>
+            <p:nvPr/>
+          </p:nvGrpSpPr>
+          <p:grpSpPr>
+            <a:xfrm>
+              <a:off x="3760494" y="3990159"/>
+              <a:ext cx="1219401" cy="352084"/>
+              <a:chOff x="3760494" y="3990159"/>
+              <a:chExt cx="1219401" cy="352084"/>
+            </a:xfrm>
+          </p:grpSpPr>
+          <p:pic>
+            <p:nvPicPr>
+              <p:cNvPr id="21" name="Picture 20">
+                <a:extLst>
+                  <a:ext uri="{FF2B5EF4-FFF2-40B4-BE49-F238E27FC236}">
+                    <a16:creationId xmlns:a16="http://schemas.microsoft.com/office/drawing/2014/main" id="{60C758BC-9704-AB20-74DD-C73A1735C38F}"/>
+                  </a:ext>
+                </a:extLst>
+              </p:cNvPr>
+              <p:cNvPicPr>
+                <a:picLocks noChangeAspect="1"/>
+              </p:cNvPicPr>
+              <p:nvPr/>
+            </p:nvPicPr>
+            <p:blipFill>
+              <a:blip r:embed="rId2" cstate="print">
+                <a:extLst>
+                  <a:ext uri="{28A0092B-C50C-407E-A947-70E740481C1C}">
+                    <a14:useLocalDpi xmlns:a14="http://schemas.microsoft.com/office/drawing/2010/main" val="0"/>
+                  </a:ext>
+                </a:extLst>
+              </a:blip>
+              <a:stretch>
+                <a:fillRect/>
+              </a:stretch>
+            </p:blipFill>
+            <p:spPr>
+              <a:xfrm>
+                <a:off x="4079422" y="3992059"/>
+                <a:ext cx="900473" cy="350184"/>
+              </a:xfrm>
+              <a:prstGeom prst="rect">
+                <a:avLst/>
+              </a:prstGeom>
+            </p:spPr>
+          </p:pic>
+          <p:pic>
+            <p:nvPicPr>
+              <p:cNvPr id="22" name="Picture 21">
+                <a:extLst>
+                  <a:ext uri="{FF2B5EF4-FFF2-40B4-BE49-F238E27FC236}">
+                    <a16:creationId xmlns:a16="http://schemas.microsoft.com/office/drawing/2014/main" id="{46A1E705-BF64-C9B1-9EA6-1B61AE20C5A1}"/>
+                  </a:ext>
+                </a:extLst>
+              </p:cNvPr>
+              <p:cNvPicPr>
+                <a:picLocks noChangeAspect="1"/>
+              </p:cNvPicPr>
+              <p:nvPr/>
+            </p:nvPicPr>
+            <p:blipFill>
+              <a:blip r:embed="rId3" cstate="print">
+                <a:extLst>
+                  <a:ext uri="{28A0092B-C50C-407E-A947-70E740481C1C}">
+                    <a14:useLocalDpi xmlns:a14="http://schemas.microsoft.com/office/drawing/2010/main" val="0"/>
+                  </a:ext>
+                </a:extLst>
+              </a:blip>
+              <a:stretch>
+                <a:fillRect/>
+              </a:stretch>
+            </p:blipFill>
+            <p:spPr>
+              <a:xfrm>
+                <a:off x="3760494" y="3990159"/>
+                <a:ext cx="322073" cy="324658"/>
+              </a:xfrm>
+              <a:prstGeom prst="rect">
+                <a:avLst/>
+              </a:prstGeom>
+            </p:spPr>
+          </p:pic>
+        </p:grpSp>
+      </p:grpSp>
+      <p:pic>
+        <p:nvPicPr>
+          <p:cNvPr id="23" name="Picture 22">
+            <a:extLst>
+              <a:ext uri="{FF2B5EF4-FFF2-40B4-BE49-F238E27FC236}">
+                <a16:creationId xmlns:a16="http://schemas.microsoft.com/office/drawing/2014/main" id="{0ED9F571-FE92-AC57-60E9-AF7BDDFE764E}"/>
+              </a:ext>
+            </a:extLst>
+          </p:cNvPr>
+          <p:cNvPicPr>
+            <a:picLocks noChangeAspect="1"/>
+          </p:cNvPicPr>
+          <p:nvPr/>
+        </p:nvPicPr>
+        <p:blipFill>
+          <a:blip r:embed="rId4" cstate="print">
+            <a:extLst>
+              <a:ext uri="{28A0092B-C50C-407E-A947-70E740481C1C}">
+                <a14:useLocalDpi xmlns:a14="http://schemas.microsoft.com/office/drawing/2010/main" val="0"/>
+              </a:ext>
+            </a:extLst>
+          </a:blip>
+          <a:stretch>
+            <a:fillRect/>
+          </a:stretch>
+        </p:blipFill>
+        <p:spPr>
+          <a:xfrm>
+            <a:off x="3274897" y="4781355"/>
+            <a:ext cx="1276237" cy="215542"/>
+          </a:xfrm>
+          <a:prstGeom prst="rect">
+            <a:avLst/>
+          </a:prstGeom>
+        </p:spPr>
+      </p:pic>
+      <p:sp>
+        <p:nvSpPr>
+          <p:cNvPr id="5" name="Rounded Rectangle 89">
+            <a:extLst>
+              <a:ext uri="{FF2B5EF4-FFF2-40B4-BE49-F238E27FC236}">
+                <a16:creationId xmlns:a16="http://schemas.microsoft.com/office/drawing/2014/main" id="{9B87D24C-ECAB-6349-C91F-FB8EAAC91D68}"/>
+              </a:ext>
+            </a:extLst>
+          </p:cNvPr>
+          <p:cNvSpPr/>
+          <p:nvPr/>
+        </p:nvSpPr>
+        <p:spPr>
+          <a:xfrm rot="16200000">
+            <a:off x="2667160" y="2790960"/>
+            <a:ext cx="2503213" cy="1389776"/>
+          </a:xfrm>
+          <a:prstGeom prst="roundRect">
+            <a:avLst>
+              <a:gd name="adj" fmla="val 17549"/>
+            </a:avLst>
+          </a:prstGeom>
+          <a:solidFill>
+            <a:srgbClr val="FFFFFF"/>
+          </a:solidFill>
+          <a:ln w="12700" cap="flat" cmpd="sng" algn="ctr">
+            <a:solidFill>
+              <a:srgbClr val="CBD3D7">
+                <a:lumMod val="75000"/>
+              </a:srgbClr>
+            </a:solidFill>
+            <a:prstDash val="solid"/>
+          </a:ln>
+          <a:effectLst/>
+        </p:spPr>
+        <p:txBody>
+          <a:bodyPr lIns="180000" tIns="0" bIns="0" rtlCol="0" anchor="ctr"/>
+          <a:lstStyle/>
+          <a:p>
+            <a:pPr marL="0" marR="0" lvl="0" indent="0" defTabSz="914377" eaLnBrk="1" fontAlgn="auto" latinLnBrk="0" hangingPunct="1">
+              <a:lnSpc>
+                <a:spcPct val="100000"/>
+              </a:lnSpc>
+              <a:spcBef>
+                <a:spcPts val="0"/>
+              </a:spcBef>
+              <a:spcAft>
+                <a:spcPts val="0"/>
+              </a:spcAft>
+              <a:buClrTx/>
+              <a:buSzTx/>
+              <a:buFontTx/>
+              <a:buNone/>
+              <a:tabLst/>
+              <a:defRPr/>
+            </a:pPr>
+            <a:endParaRPr kumimoji="0" lang="en-US" sz="1200" b="0" i="0" u="none" strike="noStrike" kern="0" cap="none" spc="0" normalizeH="0" baseline="0" noProof="0" dirty="0">
+              <a:ln>
+                <a:noFill/>
+              </a:ln>
+              <a:solidFill>
+                <a:srgbClr val="4B5357"/>
+              </a:solidFill>
+              <a:effectLst/>
+              <a:uLnTx/>
+              <a:uFillTx/>
+              <a:latin typeface="Source Sans Pro" panose="020B0503030403020204" pitchFamily="34" charset="0"/>
+              <a:ea typeface="Source Sans Pro" panose="020B0503030403020204" pitchFamily="34" charset="0"/>
+              <a:cs typeface="+mn-cs"/>
+            </a:endParaRPr>
+          </a:p>
+        </p:txBody>
+      </p:sp>
+      <p:sp>
+        <p:nvSpPr>
+          <p:cNvPr id="8" name="Rounded Rectangle 92">
+            <a:extLst>
+              <a:ext uri="{FF2B5EF4-FFF2-40B4-BE49-F238E27FC236}">
+                <a16:creationId xmlns:a16="http://schemas.microsoft.com/office/drawing/2014/main" id="{4D961F53-6591-2AD4-D8A6-237879E54735}"/>
+              </a:ext>
+            </a:extLst>
+          </p:cNvPr>
+          <p:cNvSpPr/>
+          <p:nvPr/>
+        </p:nvSpPr>
+        <p:spPr>
+          <a:xfrm rot="16200000">
+            <a:off x="2409069" y="2511966"/>
+            <a:ext cx="3019391" cy="1174744"/>
+          </a:xfrm>
+          <a:prstGeom prst="roundRect">
+            <a:avLst>
+              <a:gd name="adj" fmla="val 17902"/>
+            </a:avLst>
+          </a:prstGeom>
+          <a:noFill/>
+          <a:ln w="12700" cap="flat" cmpd="sng" algn="ctr">
+            <a:noFill/>
+            <a:prstDash val="solid"/>
+          </a:ln>
+          <a:effectLst/>
+        </p:spPr>
+        <p:txBody>
+          <a:bodyPr lIns="72000" tIns="0" rIns="0" bIns="0" rtlCol="0" anchor="ctr"/>
+          <a:lstStyle/>
+          <a:p>
+            <a:pPr marL="0" marR="0" lvl="0" indent="0" defTabSz="914377" eaLnBrk="1" fontAlgn="auto" latinLnBrk="0" hangingPunct="1">
+              <a:lnSpc>
+                <a:spcPct val="100000"/>
+              </a:lnSpc>
+              <a:spcBef>
+                <a:spcPts val="0"/>
+              </a:spcBef>
+              <a:spcAft>
+                <a:spcPts val="0"/>
+              </a:spcAft>
+              <a:buClrTx/>
+              <a:buSzTx/>
+              <a:buFontTx/>
+              <a:buNone/>
+              <a:tabLst/>
+              <a:defRPr/>
+            </a:pPr>
+            <a:endParaRPr kumimoji="0" lang="en-US" sz="1200" b="0" i="0" u="none" strike="noStrike" kern="0" cap="none" spc="0" normalizeH="0" baseline="0" noProof="0" dirty="0">
+              <a:ln>
+                <a:noFill/>
+              </a:ln>
+              <a:solidFill>
+                <a:srgbClr val="EE502E">
+                  <a:lumMod val="50000"/>
+                </a:srgbClr>
+              </a:solidFill>
+              <a:effectLst/>
+              <a:uLnTx/>
+              <a:uFillTx/>
+              <a:latin typeface="Source Sans Pro" panose="020B0503030403020204" pitchFamily="34" charset="0"/>
+              <a:ea typeface="Source Sans Pro" panose="020B0503030403020204" pitchFamily="34" charset="0"/>
+              <a:cs typeface="+mn-cs"/>
+            </a:endParaRPr>
+          </a:p>
+        </p:txBody>
+      </p:sp>
+      <p:grpSp>
+        <p:nvGrpSpPr>
+          <p:cNvPr id="11" name="Group 10">
+            <a:extLst>
+              <a:ext uri="{FF2B5EF4-FFF2-40B4-BE49-F238E27FC236}">
+                <a16:creationId xmlns:a16="http://schemas.microsoft.com/office/drawing/2014/main" id="{4E2D4B36-F9A3-CE5B-C7B2-F50A3E2D89FC}"/>
+              </a:ext>
+            </a:extLst>
+          </p:cNvPr>
+          <p:cNvGrpSpPr/>
+          <p:nvPr/>
+        </p:nvGrpSpPr>
+        <p:grpSpPr>
+          <a:xfrm>
+            <a:off x="3385756" y="3687640"/>
+            <a:ext cx="1157060" cy="451104"/>
+            <a:chOff x="3349075" y="4157931"/>
+            <a:chExt cx="1157060" cy="451104"/>
+          </a:xfrm>
+        </p:grpSpPr>
+        <p:sp>
+          <p:nvSpPr>
+            <p:cNvPr id="7" name="Round Same Side Corner Rectangle 50">
+              <a:extLst>
+                <a:ext uri="{FF2B5EF4-FFF2-40B4-BE49-F238E27FC236}">
+                  <a16:creationId xmlns:a16="http://schemas.microsoft.com/office/drawing/2014/main" id="{35D43C98-9C36-2B41-6234-4D017464BB5E}"/>
+                </a:ext>
+              </a:extLst>
+            </p:cNvPr>
+            <p:cNvSpPr/>
+            <p:nvPr/>
+          </p:nvSpPr>
+          <p:spPr>
+            <a:xfrm rot="10800000">
+              <a:off x="3349075" y="4157931"/>
+              <a:ext cx="1157060" cy="451104"/>
+            </a:xfrm>
+            <a:prstGeom prst="round2SameRect">
+              <a:avLst>
+                <a:gd name="adj1" fmla="val 0"/>
+                <a:gd name="adj2" fmla="val 0"/>
+              </a:avLst>
+            </a:prstGeom>
+            <a:solidFill>
+              <a:srgbClr val="EE502E">
+                <a:lumMod val="40000"/>
+                <a:lumOff val="60000"/>
+              </a:srgbClr>
+            </a:solidFill>
+            <a:ln w="12700" cap="flat" cmpd="sng" algn="ctr">
+              <a:noFill/>
+              <a:prstDash val="solid"/>
+              <a:round/>
+            </a:ln>
+            <a:effectLst/>
+          </p:spPr>
+          <p:txBody>
+            <a:bodyPr rtlCol="0" anchor="ctr"/>
+            <a:lstStyle/>
+            <a:p>
+              <a:pPr marL="0" marR="0" lvl="0" indent="0" algn="ctr" defTabSz="914377" eaLnBrk="1" fontAlgn="auto" latinLnBrk="0" hangingPunct="1">
+                <a:lnSpc>
+                  <a:spcPct val="100000"/>
+                </a:lnSpc>
+                <a:spcBef>
+                  <a:spcPts val="0"/>
+                </a:spcBef>
+                <a:spcAft>
+                  <a:spcPts val="0"/>
+                </a:spcAft>
+                <a:buClrTx/>
+                <a:buSzTx/>
+                <a:buFontTx/>
+                <a:buNone/>
+                <a:tabLst/>
+                <a:defRPr/>
+              </a:pPr>
+              <a:endParaRPr kumimoji="0" lang="en-US" sz="1800" b="0" i="0" u="none" strike="noStrike" kern="0" cap="none" spc="0" normalizeH="0" baseline="0" noProof="0" dirty="0">
+                <a:ln>
+                  <a:noFill/>
+                </a:ln>
+                <a:solidFill>
+                  <a:srgbClr val="FFFFFF"/>
+                </a:solidFill>
+                <a:effectLst/>
+                <a:uLnTx/>
+                <a:uFillTx/>
+                <a:latin typeface="Calibri Light"/>
+                <a:ea typeface="+mn-ea"/>
+                <a:cs typeface="+mn-cs"/>
+              </a:endParaRPr>
+            </a:p>
+          </p:txBody>
+        </p:sp>
+        <p:sp>
+          <p:nvSpPr>
+            <p:cNvPr id="9" name="TextBox 8">
+              <a:extLst>
+                <a:ext uri="{FF2B5EF4-FFF2-40B4-BE49-F238E27FC236}">
+                  <a16:creationId xmlns:a16="http://schemas.microsoft.com/office/drawing/2014/main" id="{B2F5E127-51A5-5D80-19F6-3912D67086E1}"/>
+                </a:ext>
+              </a:extLst>
+            </p:cNvPr>
+            <p:cNvSpPr txBox="1"/>
+            <p:nvPr/>
+          </p:nvSpPr>
+          <p:spPr>
+            <a:xfrm>
+              <a:off x="3589787" y="4293820"/>
+              <a:ext cx="762000" cy="215444"/>
+            </a:xfrm>
+            <a:prstGeom prst="rect">
+              <a:avLst/>
+            </a:prstGeom>
+            <a:noFill/>
+          </p:spPr>
+          <p:txBody>
+            <a:bodyPr vert="horz" wrap="square" lIns="0" tIns="0" rIns="0" bIns="0" numCol="1" spcCol="288000" rtlCol="0" anchor="t" anchorCtr="0">
+              <a:spAutoFit/>
+            </a:bodyPr>
+            <a:lstStyle/>
+            <a:p>
+              <a:pPr algn="l">
+                <a:spcBef>
+                  <a:spcPts val="0"/>
+                </a:spcBef>
+                <a:spcAft>
+                  <a:spcPts val="600"/>
+                </a:spcAft>
+              </a:pPr>
+              <a:r>
+                <a:rPr lang="en-US" sz="1400" b="0" i="0" spc="0" dirty="0">
+                  <a:ln>
+                    <a:noFill/>
+                  </a:ln>
+                  <a:latin typeface="Consolas" panose="020B0609020204030204" pitchFamily="49" charset="0"/>
+                  <a:ea typeface="Source Sans Pro Light" charset="0"/>
+                  <a:cs typeface="Source Sans Pro Light" charset="0"/>
+                </a:rPr>
+                <a:t>method1</a:t>
+              </a:r>
+            </a:p>
+          </p:txBody>
+        </p:sp>
+      </p:grpSp>
+      <p:sp>
+        <p:nvSpPr>
+          <p:cNvPr id="10" name="Round Same Side Corner Rectangle 50">
+            <a:extLst>
+              <a:ext uri="{FF2B5EF4-FFF2-40B4-BE49-F238E27FC236}">
+                <a16:creationId xmlns:a16="http://schemas.microsoft.com/office/drawing/2014/main" id="{2D0BA719-5021-B7AF-63BC-9B50A153DB7F}"/>
+              </a:ext>
+            </a:extLst>
+          </p:cNvPr>
+          <p:cNvSpPr/>
+          <p:nvPr/>
+        </p:nvSpPr>
+        <p:spPr>
+          <a:xfrm rot="10800000">
+            <a:off x="3374219" y="3169507"/>
+            <a:ext cx="1157060" cy="451104"/>
+          </a:xfrm>
+          <a:prstGeom prst="round2SameRect">
+            <a:avLst>
+              <a:gd name="adj1" fmla="val 0"/>
+              <a:gd name="adj2" fmla="val 0"/>
+            </a:avLst>
+          </a:prstGeom>
+          <a:solidFill>
+            <a:schemeClr val="accent2">
+              <a:alpha val="50000"/>
+            </a:schemeClr>
+          </a:solidFill>
+          <a:ln>
+            <a:noFill/>
+          </a:ln>
+        </p:spPr>
+        <p:style>
+          <a:lnRef idx="0">
+            <a:scrgbClr r="0" g="0" b="0"/>
+          </a:lnRef>
+          <a:fillRef idx="0">
+            <a:scrgbClr r="0" g="0" b="0"/>
+          </a:fillRef>
+          <a:effectRef idx="0">
+            <a:scrgbClr r="0" g="0" b="0"/>
+          </a:effectRef>
+          <a:fontRef idx="minor">
+            <a:schemeClr val="lt1"/>
+          </a:fontRef>
+        </p:style>
+        <p:txBody>
+          <a:bodyPr rtlCol="0" anchor="ctr"/>
+          <a:lstStyle/>
+          <a:p>
+            <a:pPr marL="0" marR="0" lvl="0" indent="0" algn="ctr" defTabSz="914377" eaLnBrk="1" fontAlgn="auto" latinLnBrk="0" hangingPunct="1">
+              <a:lnSpc>
+                <a:spcPct val="100000"/>
+              </a:lnSpc>
+              <a:spcBef>
+                <a:spcPts val="0"/>
+              </a:spcBef>
+              <a:spcAft>
+                <a:spcPts val="0"/>
+              </a:spcAft>
+              <a:buClrTx/>
+              <a:buSzTx/>
+              <a:buFontTx/>
+              <a:buNone/>
+              <a:tabLst/>
+              <a:defRPr/>
+            </a:pPr>
+            <a:endParaRPr kumimoji="0" lang="en-US" sz="1800" b="0" i="0" u="none" strike="noStrike" kern="0" cap="none" spc="0" normalizeH="0" baseline="0" noProof="0" dirty="0">
+              <a:ln>
+                <a:noFill/>
+              </a:ln>
+              <a:solidFill>
+                <a:srgbClr val="FFFFFF"/>
+              </a:solidFill>
+              <a:effectLst/>
+              <a:uLnTx/>
+              <a:uFillTx/>
+              <a:latin typeface="Calibri Light"/>
+              <a:ea typeface="+mn-ea"/>
+              <a:cs typeface="+mn-cs"/>
+            </a:endParaRPr>
+          </a:p>
+        </p:txBody>
+      </p:sp>
+      <p:sp>
+        <p:nvSpPr>
+          <p:cNvPr id="12" name="TextBox 11">
+            <a:extLst>
+              <a:ext uri="{FF2B5EF4-FFF2-40B4-BE49-F238E27FC236}">
+                <a16:creationId xmlns:a16="http://schemas.microsoft.com/office/drawing/2014/main" id="{6898FB2F-89BB-C64B-61FF-7193751996E9}"/>
+              </a:ext>
+            </a:extLst>
+          </p:cNvPr>
+          <p:cNvSpPr txBox="1"/>
+          <p:nvPr/>
+        </p:nvSpPr>
+        <p:spPr>
+          <a:xfrm>
+            <a:off x="3374218" y="3287337"/>
+            <a:ext cx="1157061" cy="215444"/>
+          </a:xfrm>
+          <a:prstGeom prst="rect">
+            <a:avLst/>
+          </a:prstGeom>
+          <a:noFill/>
+        </p:spPr>
+        <p:txBody>
+          <a:bodyPr vert="horz" wrap="square" lIns="0" tIns="0" rIns="0" bIns="0" numCol="1" spcCol="288000" rtlCol="0" anchor="t" anchorCtr="0">
+            <a:spAutoFit/>
+          </a:bodyPr>
+          <a:lstStyle/>
+          <a:p>
+            <a:pPr algn="ctr">
+              <a:spcBef>
+                <a:spcPts val="0"/>
+              </a:spcBef>
+              <a:spcAft>
+                <a:spcPts val="600"/>
+              </a:spcAft>
+            </a:pPr>
+            <a:r>
+              <a:rPr lang="en-US" sz="1400" b="0" i="0" spc="0" dirty="0">
+                <a:ln>
+                  <a:noFill/>
+                </a:ln>
+                <a:latin typeface="Consolas" panose="020B0609020204030204" pitchFamily="49" charset="0"/>
+                <a:ea typeface="Source Sans Pro Light" charset="0"/>
+                <a:cs typeface="Source Sans Pro Light" charset="0"/>
+              </a:rPr>
+              <a:t>function1</a:t>
+            </a:r>
+          </a:p>
+        </p:txBody>
+      </p:sp>
+      <p:cxnSp>
+        <p:nvCxnSpPr>
+          <p:cNvPr id="32" name="Straight Arrow Connector 31">
+            <a:extLst>
+              <a:ext uri="{FF2B5EF4-FFF2-40B4-BE49-F238E27FC236}">
+                <a16:creationId xmlns:a16="http://schemas.microsoft.com/office/drawing/2014/main" id="{334280A2-1FFE-243F-EFAA-893369E14676}"/>
+              </a:ext>
+            </a:extLst>
+          </p:cNvPr>
+          <p:cNvCxnSpPr>
+            <a:cxnSpLocks/>
+          </p:cNvCxnSpPr>
+          <p:nvPr/>
+        </p:nvCxnSpPr>
+        <p:spPr>
+          <a:xfrm>
+            <a:off x="4708233" y="2616267"/>
+            <a:ext cx="0" cy="1004345"/>
+          </a:xfrm>
+          <a:prstGeom prst="straightConnector1">
+            <a:avLst/>
+          </a:prstGeom>
+          <a:ln>
+            <a:tailEnd type="triangle"/>
+          </a:ln>
+        </p:spPr>
+        <p:style>
+          <a:lnRef idx="3">
+            <a:schemeClr val="accent1"/>
+          </a:lnRef>
+          <a:fillRef idx="0">
+            <a:schemeClr val="accent1"/>
+          </a:fillRef>
+          <a:effectRef idx="2">
+            <a:schemeClr val="accent1"/>
+          </a:effectRef>
+          <a:fontRef idx="minor">
+            <a:schemeClr val="tx1"/>
+          </a:fontRef>
+        </p:style>
+      </p:cxnSp>
+      <p:sp>
+        <p:nvSpPr>
+          <p:cNvPr id="33" name="TextBox 32">
+            <a:extLst>
+              <a:ext uri="{FF2B5EF4-FFF2-40B4-BE49-F238E27FC236}">
+                <a16:creationId xmlns:a16="http://schemas.microsoft.com/office/drawing/2014/main" id="{E49EB621-F71E-4231-3759-2608F6CB5F89}"/>
+              </a:ext>
+            </a:extLst>
+          </p:cNvPr>
+          <p:cNvSpPr txBox="1"/>
+          <p:nvPr/>
+        </p:nvSpPr>
+        <p:spPr>
+          <a:xfrm>
+            <a:off x="336944" y="260647"/>
+            <a:ext cx="338234" cy="215444"/>
+          </a:xfrm>
+          <a:prstGeom prst="rect">
+            <a:avLst/>
+          </a:prstGeom>
+          <a:noFill/>
+        </p:spPr>
+        <p:txBody>
+          <a:bodyPr vert="horz" wrap="none" lIns="0" tIns="0" rIns="0" bIns="0" numCol="1" spcCol="288000" rtlCol="0" anchor="t" anchorCtr="0">
+            <a:spAutoFit/>
+          </a:bodyPr>
+          <a:lstStyle/>
+          <a:p>
+            <a:pPr algn="l">
+              <a:spcBef>
+                <a:spcPts val="0"/>
+              </a:spcBef>
+              <a:spcAft>
+                <a:spcPts val="600"/>
+              </a:spcAft>
+            </a:pPr>
+            <a:r>
+              <a:rPr lang="en-US" sz="1400" dirty="0">
+                <a:solidFill>
+                  <a:schemeClr val="tx2"/>
+                </a:solidFill>
+                <a:latin typeface="Source Sans Pro Light" charset="0"/>
+                <a:ea typeface="Source Sans Pro Light" charset="0"/>
+                <a:cs typeface="Source Sans Pro Light" charset="0"/>
+              </a:rPr>
+              <a:t>Trap</a:t>
+            </a:r>
+            <a:endParaRPr lang="en-US" sz="1400" b="0" i="0" spc="0" dirty="0">
+              <a:ln>
+                <a:noFill/>
+              </a:ln>
+              <a:solidFill>
+                <a:schemeClr val="tx2"/>
+              </a:solidFill>
+              <a:latin typeface="Source Sans Pro Light" charset="0"/>
+              <a:ea typeface="Source Sans Pro Light" charset="0"/>
+              <a:cs typeface="Source Sans Pro Light" charset="0"/>
+            </a:endParaRPr>
+          </a:p>
+        </p:txBody>
+      </p:sp>
+      <p:sp>
+        <p:nvSpPr>
+          <p:cNvPr id="34" name="Rounded Rectangle 89">
+            <a:extLst>
+              <a:ext uri="{FF2B5EF4-FFF2-40B4-BE49-F238E27FC236}">
+                <a16:creationId xmlns:a16="http://schemas.microsoft.com/office/drawing/2014/main" id="{2B70A9FE-6C33-C905-F51C-1BAE34B7ABD6}"/>
+              </a:ext>
+            </a:extLst>
+          </p:cNvPr>
+          <p:cNvSpPr/>
+          <p:nvPr/>
+        </p:nvSpPr>
+        <p:spPr>
+          <a:xfrm>
+            <a:off x="3286433" y="3643740"/>
+            <a:ext cx="414047" cy="174885"/>
+          </a:xfrm>
+          <a:prstGeom prst="roundRect">
+            <a:avLst>
+              <a:gd name="adj" fmla="val 22381"/>
+            </a:avLst>
+          </a:prstGeom>
+          <a:solidFill>
+            <a:schemeClr val="accent2"/>
+          </a:solidFill>
+          <a:ln>
+            <a:noFill/>
+          </a:ln>
+        </p:spPr>
+        <p:style>
+          <a:lnRef idx="2">
+            <a:schemeClr val="accent1">
+              <a:shade val="50000"/>
+            </a:schemeClr>
+          </a:lnRef>
+          <a:fillRef idx="1">
+            <a:schemeClr val="accent1"/>
+          </a:fillRef>
+          <a:effectRef idx="0">
+            <a:schemeClr val="accent1"/>
+          </a:effectRef>
+          <a:fontRef idx="minor">
+            <a:schemeClr val="lt1"/>
+          </a:fontRef>
+        </p:style>
+        <p:txBody>
+          <a:bodyPr lIns="0" tIns="0" rIns="0" bIns="0" rtlCol="0" anchor="ctr"/>
+          <a:lstStyle/>
+          <a:p>
+            <a:pPr algn="ctr">
+              <a:lnSpc>
+                <a:spcPts val="600"/>
+              </a:lnSpc>
+            </a:pPr>
+            <a:r>
+              <a:rPr lang="en-FR" sz="800" b="1" spc="-30" dirty="0">
+                <a:latin typeface=""/>
+              </a:rPr>
+              <a:t>Java</a:t>
+            </a:r>
+          </a:p>
+        </p:txBody>
+      </p:sp>
+      <p:sp>
+        <p:nvSpPr>
+          <p:cNvPr id="35" name="Rounded Rectangle 96">
+            <a:extLst>
+              <a:ext uri="{FF2B5EF4-FFF2-40B4-BE49-F238E27FC236}">
+                <a16:creationId xmlns:a16="http://schemas.microsoft.com/office/drawing/2014/main" id="{64C323ED-7FC4-E179-70F2-E9B6D31C5BF2}"/>
+              </a:ext>
+            </a:extLst>
+          </p:cNvPr>
+          <p:cNvSpPr/>
+          <p:nvPr/>
+        </p:nvSpPr>
+        <p:spPr>
+          <a:xfrm>
+            <a:off x="3274896" y="3112451"/>
+            <a:ext cx="210526" cy="174885"/>
+          </a:xfrm>
+          <a:prstGeom prst="roundRect">
+            <a:avLst>
+              <a:gd name="adj" fmla="val 22381"/>
+            </a:avLst>
+          </a:prstGeom>
+          <a:solidFill>
+            <a:srgbClr val="0070C0"/>
+          </a:solidFill>
+          <a:ln>
+            <a:noFill/>
+          </a:ln>
+        </p:spPr>
+        <p:style>
+          <a:lnRef idx="2">
+            <a:schemeClr val="accent1">
+              <a:shade val="50000"/>
+            </a:schemeClr>
+          </a:lnRef>
+          <a:fillRef idx="1">
+            <a:schemeClr val="accent1"/>
+          </a:fillRef>
+          <a:effectRef idx="0">
+            <a:schemeClr val="accent1"/>
+          </a:effectRef>
+          <a:fontRef idx="minor">
+            <a:schemeClr val="lt1"/>
+          </a:fontRef>
+        </p:style>
+        <p:txBody>
+          <a:bodyPr lIns="0" tIns="0" rIns="0" bIns="0" rtlCol="0" anchor="ctr"/>
+          <a:lstStyle/>
+          <a:p>
+            <a:pPr algn="ctr"/>
+            <a:r>
+              <a:rPr lang="en-FR" sz="800" b="1" spc="-30" dirty="0">
+                <a:solidFill>
+                  <a:schemeClr val="bg1"/>
+                </a:solidFill>
+                <a:latin typeface=""/>
+              </a:rPr>
+              <a:t>C</a:t>
+            </a:r>
+          </a:p>
+        </p:txBody>
+      </p:sp>
+      <p:sp>
+        <p:nvSpPr>
+          <p:cNvPr id="4" name="Round Same Side Corner Rectangle 50">
+            <a:extLst>
+              <a:ext uri="{FF2B5EF4-FFF2-40B4-BE49-F238E27FC236}">
+                <a16:creationId xmlns:a16="http://schemas.microsoft.com/office/drawing/2014/main" id="{E96997AB-460F-7359-B6EA-D8033056FCBC}"/>
+              </a:ext>
+            </a:extLst>
+          </p:cNvPr>
+          <p:cNvSpPr/>
+          <p:nvPr/>
+        </p:nvSpPr>
+        <p:spPr>
+          <a:xfrm rot="10800000">
+            <a:off x="3374219" y="2609009"/>
+            <a:ext cx="1157060" cy="451104"/>
+          </a:xfrm>
+          <a:prstGeom prst="round2SameRect">
+            <a:avLst>
+              <a:gd name="adj1" fmla="val 0"/>
+              <a:gd name="adj2" fmla="val 0"/>
+            </a:avLst>
+          </a:prstGeom>
+          <a:solidFill>
+            <a:schemeClr val="accent2">
+              <a:alpha val="50000"/>
+            </a:schemeClr>
+          </a:solidFill>
+          <a:ln>
+            <a:noFill/>
+          </a:ln>
+        </p:spPr>
+        <p:style>
+          <a:lnRef idx="0">
+            <a:scrgbClr r="0" g="0" b="0"/>
+          </a:lnRef>
+          <a:fillRef idx="0">
+            <a:scrgbClr r="0" g="0" b="0"/>
+          </a:fillRef>
+          <a:effectRef idx="0">
+            <a:scrgbClr r="0" g="0" b="0"/>
+          </a:effectRef>
+          <a:fontRef idx="minor">
+            <a:schemeClr val="lt1"/>
+          </a:fontRef>
+        </p:style>
+        <p:txBody>
+          <a:bodyPr rtlCol="0" anchor="ctr"/>
+          <a:lstStyle/>
+          <a:p>
+            <a:pPr marL="0" marR="0" lvl="0" indent="0" algn="ctr" defTabSz="914377" eaLnBrk="1" fontAlgn="auto" latinLnBrk="0" hangingPunct="1">
+              <a:lnSpc>
+                <a:spcPct val="100000"/>
+              </a:lnSpc>
+              <a:spcBef>
+                <a:spcPts val="0"/>
+              </a:spcBef>
+              <a:spcAft>
+                <a:spcPts val="0"/>
+              </a:spcAft>
+              <a:buClrTx/>
+              <a:buSzTx/>
+              <a:buFontTx/>
+              <a:buNone/>
+              <a:tabLst/>
+              <a:defRPr/>
+            </a:pPr>
+            <a:endParaRPr kumimoji="0" lang="en-US" sz="1800" b="0" i="0" u="none" strike="noStrike" kern="0" cap="none" spc="0" normalizeH="0" baseline="0" noProof="0" dirty="0">
+              <a:ln>
+                <a:noFill/>
+              </a:ln>
+              <a:solidFill>
+                <a:srgbClr val="FFFFFF"/>
+              </a:solidFill>
+              <a:effectLst/>
+              <a:uLnTx/>
+              <a:uFillTx/>
+              <a:latin typeface="Calibri Light"/>
+              <a:ea typeface="+mn-ea"/>
+              <a:cs typeface="+mn-cs"/>
+            </a:endParaRPr>
+          </a:p>
+        </p:txBody>
+      </p:sp>
+      <p:sp>
+        <p:nvSpPr>
+          <p:cNvPr id="6" name="TextBox 5">
+            <a:extLst>
+              <a:ext uri="{FF2B5EF4-FFF2-40B4-BE49-F238E27FC236}">
+                <a16:creationId xmlns:a16="http://schemas.microsoft.com/office/drawing/2014/main" id="{3BF59577-2DCC-B0CC-A7AD-9E3DA77A5782}"/>
+              </a:ext>
+            </a:extLst>
+          </p:cNvPr>
+          <p:cNvSpPr txBox="1"/>
+          <p:nvPr/>
+        </p:nvSpPr>
+        <p:spPr>
+          <a:xfrm>
+            <a:off x="3374218" y="2726839"/>
+            <a:ext cx="1157061" cy="215444"/>
+          </a:xfrm>
+          <a:prstGeom prst="rect">
+            <a:avLst/>
+          </a:prstGeom>
+          <a:noFill/>
+        </p:spPr>
+        <p:txBody>
+          <a:bodyPr vert="horz" wrap="square" lIns="0" tIns="0" rIns="0" bIns="0" numCol="1" spcCol="288000" rtlCol="0" anchor="t" anchorCtr="0">
+            <a:spAutoFit/>
+          </a:bodyPr>
+          <a:lstStyle/>
+          <a:p>
+            <a:pPr algn="ctr">
+              <a:spcBef>
+                <a:spcPts val="0"/>
+              </a:spcBef>
+              <a:spcAft>
+                <a:spcPts val="600"/>
+              </a:spcAft>
+            </a:pPr>
+            <a:r>
+              <a:rPr lang="en-US" sz="1400" b="0" i="0" spc="0" dirty="0">
+                <a:ln>
+                  <a:noFill/>
+                </a:ln>
+                <a:latin typeface="Consolas" panose="020B0609020204030204" pitchFamily="49" charset="0"/>
+                <a:ea typeface="Source Sans Pro Light" charset="0"/>
+                <a:cs typeface="Source Sans Pro Light" charset="0"/>
+              </a:rPr>
+              <a:t>function2</a:t>
+            </a:r>
+          </a:p>
+        </p:txBody>
+      </p:sp>
+      <p:sp>
+        <p:nvSpPr>
+          <p:cNvPr id="15" name="Rounded Rectangle 96">
+            <a:extLst>
+              <a:ext uri="{FF2B5EF4-FFF2-40B4-BE49-F238E27FC236}">
+                <a16:creationId xmlns:a16="http://schemas.microsoft.com/office/drawing/2014/main" id="{A2D71136-B65A-CA49-65A6-95C9334075E9}"/>
+              </a:ext>
+            </a:extLst>
+          </p:cNvPr>
+          <p:cNvSpPr/>
+          <p:nvPr/>
+        </p:nvSpPr>
+        <p:spPr>
+          <a:xfrm>
+            <a:off x="3274896" y="2551953"/>
+            <a:ext cx="210526" cy="174885"/>
+          </a:xfrm>
+          <a:prstGeom prst="roundRect">
+            <a:avLst>
+              <a:gd name="adj" fmla="val 22381"/>
+            </a:avLst>
+          </a:prstGeom>
+          <a:solidFill>
+            <a:srgbClr val="0070C0"/>
+          </a:solidFill>
+          <a:ln>
+            <a:noFill/>
+          </a:ln>
+        </p:spPr>
+        <p:style>
+          <a:lnRef idx="2">
+            <a:schemeClr val="accent1">
+              <a:shade val="50000"/>
+            </a:schemeClr>
+          </a:lnRef>
+          <a:fillRef idx="1">
+            <a:schemeClr val="accent1"/>
+          </a:fillRef>
+          <a:effectRef idx="0">
+            <a:schemeClr val="accent1"/>
+          </a:effectRef>
+          <a:fontRef idx="minor">
+            <a:schemeClr val="lt1"/>
+          </a:fontRef>
+        </p:style>
+        <p:txBody>
+          <a:bodyPr lIns="0" tIns="0" rIns="0" bIns="0" rtlCol="0" anchor="ctr"/>
+          <a:lstStyle/>
+          <a:p>
+            <a:pPr algn="ctr"/>
+            <a:r>
+              <a:rPr lang="en-FR" sz="800" b="1" spc="-30" dirty="0">
+                <a:solidFill>
+                  <a:schemeClr val="bg1"/>
+                </a:solidFill>
+                <a:latin typeface=""/>
+              </a:rPr>
+              <a:t>C</a:t>
+            </a:r>
+          </a:p>
+        </p:txBody>
+      </p:sp>
+      <p:grpSp>
+        <p:nvGrpSpPr>
+          <p:cNvPr id="16" name="Group 15">
+            <a:extLst>
+              <a:ext uri="{FF2B5EF4-FFF2-40B4-BE49-F238E27FC236}">
+                <a16:creationId xmlns:a16="http://schemas.microsoft.com/office/drawing/2014/main" id="{27E84FE5-6255-F8D3-21C7-4246A65FF5B5}"/>
+              </a:ext>
+            </a:extLst>
+          </p:cNvPr>
+          <p:cNvGrpSpPr/>
+          <p:nvPr/>
+        </p:nvGrpSpPr>
+        <p:grpSpPr>
+          <a:xfrm>
+            <a:off x="3374220" y="4221064"/>
+            <a:ext cx="1157060" cy="451104"/>
+            <a:chOff x="3349075" y="4157931"/>
+            <a:chExt cx="1157060" cy="451104"/>
+          </a:xfrm>
+        </p:grpSpPr>
+        <p:sp>
+          <p:nvSpPr>
+            <p:cNvPr id="24" name="Round Same Side Corner Rectangle 50">
+              <a:extLst>
+                <a:ext uri="{FF2B5EF4-FFF2-40B4-BE49-F238E27FC236}">
+                  <a16:creationId xmlns:a16="http://schemas.microsoft.com/office/drawing/2014/main" id="{370E928E-01CC-B329-C7EC-2918CDE05A94}"/>
+                </a:ext>
+              </a:extLst>
+            </p:cNvPr>
+            <p:cNvSpPr/>
+            <p:nvPr/>
+          </p:nvSpPr>
+          <p:spPr>
+            <a:xfrm rot="10800000">
+              <a:off x="3349075" y="4157931"/>
+              <a:ext cx="1157060" cy="451104"/>
+            </a:xfrm>
+            <a:prstGeom prst="round2SameRect">
+              <a:avLst>
+                <a:gd name="adj1" fmla="val 30831"/>
+                <a:gd name="adj2" fmla="val 0"/>
+              </a:avLst>
+            </a:prstGeom>
+            <a:solidFill>
+              <a:srgbClr val="EE502E">
+                <a:lumMod val="40000"/>
+                <a:lumOff val="60000"/>
+              </a:srgbClr>
+            </a:solidFill>
+            <a:ln w="12700" cap="flat" cmpd="sng" algn="ctr">
+              <a:noFill/>
+              <a:prstDash val="solid"/>
+              <a:round/>
+            </a:ln>
+            <a:effectLst/>
+          </p:spPr>
+          <p:txBody>
+            <a:bodyPr rtlCol="0" anchor="ctr"/>
+            <a:lstStyle/>
+            <a:p>
+              <a:pPr marL="0" marR="0" lvl="0" indent="0" algn="ctr" defTabSz="914377" eaLnBrk="1" fontAlgn="auto" latinLnBrk="0" hangingPunct="1">
+                <a:lnSpc>
+                  <a:spcPct val="100000"/>
+                </a:lnSpc>
+                <a:spcBef>
+                  <a:spcPts val="0"/>
+                </a:spcBef>
+                <a:spcAft>
+                  <a:spcPts val="0"/>
+                </a:spcAft>
+                <a:buClrTx/>
+                <a:buSzTx/>
+                <a:buFontTx/>
+                <a:buNone/>
+                <a:tabLst/>
+                <a:defRPr/>
+              </a:pPr>
+              <a:endParaRPr kumimoji="0" lang="en-US" sz="1800" b="0" i="0" u="none" strike="noStrike" kern="0" cap="none" spc="0" normalizeH="0" baseline="0" noProof="0" dirty="0">
+                <a:ln>
+                  <a:noFill/>
+                </a:ln>
+                <a:solidFill>
+                  <a:srgbClr val="FFFFFF"/>
+                </a:solidFill>
+                <a:effectLst/>
+                <a:uLnTx/>
+                <a:uFillTx/>
+                <a:latin typeface="Calibri Light"/>
+                <a:ea typeface="+mn-ea"/>
+                <a:cs typeface="+mn-cs"/>
+              </a:endParaRPr>
+            </a:p>
+          </p:txBody>
+        </p:sp>
+        <p:sp>
+          <p:nvSpPr>
+            <p:cNvPr id="25" name="TextBox 24">
+              <a:extLst>
+                <a:ext uri="{FF2B5EF4-FFF2-40B4-BE49-F238E27FC236}">
+                  <a16:creationId xmlns:a16="http://schemas.microsoft.com/office/drawing/2014/main" id="{6B89A287-99D9-5460-9BC8-00D9D91EF182}"/>
+                </a:ext>
+              </a:extLst>
+            </p:cNvPr>
+            <p:cNvSpPr txBox="1"/>
+            <p:nvPr/>
+          </p:nvSpPr>
+          <p:spPr>
+            <a:xfrm>
+              <a:off x="3707631" y="4275761"/>
+              <a:ext cx="439947" cy="215444"/>
+            </a:xfrm>
+            <a:prstGeom prst="rect">
+              <a:avLst/>
+            </a:prstGeom>
+            <a:noFill/>
+          </p:spPr>
+          <p:txBody>
+            <a:bodyPr vert="horz" wrap="square" lIns="0" tIns="0" rIns="0" bIns="0" numCol="1" spcCol="288000" rtlCol="0" anchor="t" anchorCtr="0">
+              <a:spAutoFit/>
+            </a:bodyPr>
+            <a:lstStyle/>
+            <a:p>
+              <a:pPr algn="l">
+                <a:spcBef>
+                  <a:spcPts val="0"/>
+                </a:spcBef>
+                <a:spcAft>
+                  <a:spcPts val="600"/>
+                </a:spcAft>
+              </a:pPr>
+              <a:r>
+                <a:rPr lang="en-US" sz="1400" b="0" i="0" spc="0" dirty="0">
+                  <a:ln>
+                    <a:noFill/>
+                  </a:ln>
+                  <a:latin typeface="Consolas" panose="020B0609020204030204" pitchFamily="49" charset="0"/>
+                  <a:ea typeface="Source Sans Pro Light" charset="0"/>
+                  <a:cs typeface="Source Sans Pro Light" charset="0"/>
+                </a:rPr>
+                <a:t>main</a:t>
+              </a:r>
+            </a:p>
+          </p:txBody>
+        </p:sp>
+      </p:grpSp>
+      <p:sp>
+        <p:nvSpPr>
+          <p:cNvPr id="26" name="Rounded Rectangle 89">
+            <a:extLst>
+              <a:ext uri="{FF2B5EF4-FFF2-40B4-BE49-F238E27FC236}">
+                <a16:creationId xmlns:a16="http://schemas.microsoft.com/office/drawing/2014/main" id="{DE145C74-127D-6684-66F8-B0C616BA5514}"/>
+              </a:ext>
+            </a:extLst>
+          </p:cNvPr>
+          <p:cNvSpPr/>
+          <p:nvPr/>
+        </p:nvSpPr>
+        <p:spPr>
+          <a:xfrm>
+            <a:off x="3274897" y="4177164"/>
+            <a:ext cx="414047" cy="174885"/>
+          </a:xfrm>
+          <a:prstGeom prst="roundRect">
+            <a:avLst>
+              <a:gd name="adj" fmla="val 22381"/>
+            </a:avLst>
+          </a:prstGeom>
+          <a:solidFill>
+            <a:schemeClr val="accent2"/>
+          </a:solidFill>
+          <a:ln>
+            <a:noFill/>
+          </a:ln>
+        </p:spPr>
+        <p:style>
+          <a:lnRef idx="2">
+            <a:schemeClr val="accent1">
+              <a:shade val="50000"/>
+            </a:schemeClr>
+          </a:lnRef>
+          <a:fillRef idx="1">
+            <a:schemeClr val="accent1"/>
+          </a:fillRef>
+          <a:effectRef idx="0">
+            <a:schemeClr val="accent1"/>
+          </a:effectRef>
+          <a:fontRef idx="minor">
+            <a:schemeClr val="lt1"/>
+          </a:fontRef>
+        </p:style>
+        <p:txBody>
+          <a:bodyPr lIns="0" tIns="0" rIns="0" bIns="0" rtlCol="0" anchor="ctr"/>
+          <a:lstStyle/>
+          <a:p>
+            <a:pPr algn="ctr">
+              <a:lnSpc>
+                <a:spcPts val="600"/>
+              </a:lnSpc>
+            </a:pPr>
+            <a:r>
+              <a:rPr lang="en-FR" sz="800" b="1" spc="-30" dirty="0">
+                <a:latin typeface=""/>
+              </a:rPr>
+              <a:t>Java</a:t>
+            </a:r>
+          </a:p>
+        </p:txBody>
+      </p:sp>
+      <p:grpSp>
+        <p:nvGrpSpPr>
+          <p:cNvPr id="48" name="Group 47">
+            <a:extLst>
+              <a:ext uri="{FF2B5EF4-FFF2-40B4-BE49-F238E27FC236}">
+                <a16:creationId xmlns:a16="http://schemas.microsoft.com/office/drawing/2014/main" id="{941A93F7-8631-2289-F8DC-14E48C83BEBD}"/>
+              </a:ext>
+            </a:extLst>
+          </p:cNvPr>
+          <p:cNvGrpSpPr/>
+          <p:nvPr/>
+        </p:nvGrpSpPr>
+        <p:grpSpPr>
+          <a:xfrm>
+            <a:off x="4860454" y="2461091"/>
+            <a:ext cx="3649256" cy="222514"/>
+            <a:chOff x="4860454" y="2296747"/>
+            <a:chExt cx="3649256" cy="222514"/>
+          </a:xfrm>
+        </p:grpSpPr>
+        <p:sp>
+          <p:nvSpPr>
+            <p:cNvPr id="30" name="TextBox 29">
+              <a:extLst>
+                <a:ext uri="{FF2B5EF4-FFF2-40B4-BE49-F238E27FC236}">
+                  <a16:creationId xmlns:a16="http://schemas.microsoft.com/office/drawing/2014/main" id="{0447F139-F833-44DB-5038-45A60CA37F03}"/>
+                </a:ext>
+              </a:extLst>
+            </p:cNvPr>
+            <p:cNvSpPr txBox="1"/>
+            <p:nvPr/>
+          </p:nvSpPr>
+          <p:spPr>
+            <a:xfrm>
+              <a:off x="5112946" y="2296747"/>
+              <a:ext cx="3396764" cy="215444"/>
+            </a:xfrm>
+            <a:prstGeom prst="rect">
+              <a:avLst/>
+            </a:prstGeom>
+            <a:noFill/>
+          </p:spPr>
+          <p:txBody>
+            <a:bodyPr vert="horz" wrap="none" lIns="0" tIns="0" rIns="0" bIns="0" numCol="1" spcCol="288000" rtlCol="0" anchor="t" anchorCtr="0">
+              <a:spAutoFit/>
+            </a:bodyPr>
+            <a:lstStyle/>
+            <a:p>
+              <a:pPr algn="l">
+                <a:spcBef>
+                  <a:spcPts val="0"/>
+                </a:spcBef>
+                <a:spcAft>
+                  <a:spcPts val="600"/>
+                </a:spcAft>
+              </a:pPr>
+              <a:r>
+                <a:rPr lang="en-US" sz="1400" i="0" spc="0" dirty="0" err="1">
+                  <a:ln>
+                    <a:noFill/>
+                  </a:ln>
+                  <a:solidFill>
+                    <a:schemeClr val="tx2"/>
+                  </a:solidFill>
+                  <a:latin typeface="Source Sans Pro Light" charset="0"/>
+                  <a:ea typeface="Source Sans Pro Light" charset="0"/>
+                  <a:cs typeface="Source Sans Pro Light" charset="0"/>
+                </a:rPr>
+                <a:t>Wasm</a:t>
+              </a:r>
+              <a:r>
+                <a:rPr lang="en-US" sz="1400" i="0" spc="0" dirty="0">
+                  <a:ln>
+                    <a:noFill/>
+                  </a:ln>
+                  <a:solidFill>
+                    <a:schemeClr val="tx2"/>
+                  </a:solidFill>
+                  <a:latin typeface="Source Sans Pro Light" charset="0"/>
+                  <a:ea typeface="Source Sans Pro Light" charset="0"/>
+                  <a:cs typeface="Source Sans Pro Light" charset="0"/>
+                </a:rPr>
+                <a:t> instruction </a:t>
+              </a:r>
+              <a:r>
+                <a:rPr lang="en-US" sz="1400" b="1" i="0" spc="0" dirty="0">
+                  <a:ln>
+                    <a:noFill/>
+                  </a:ln>
+                  <a:solidFill>
+                    <a:schemeClr val="tx2"/>
+                  </a:solidFill>
+                  <a:latin typeface="Source Sans Pro Light" charset="0"/>
+                  <a:ea typeface="Source Sans Pro Light" charset="0"/>
+                  <a:cs typeface="Source Sans Pro Light" charset="0"/>
+                </a:rPr>
+                <a:t>trap</a:t>
+              </a:r>
+              <a:r>
+                <a:rPr lang="en-US" sz="1400" i="0" spc="0" dirty="0">
+                  <a:ln>
+                    <a:noFill/>
+                  </a:ln>
+                  <a:solidFill>
+                    <a:schemeClr val="tx2"/>
+                  </a:solidFill>
+                  <a:latin typeface="Source Sans Pro Light" charset="0"/>
+                  <a:ea typeface="Source Sans Pro Light" charset="0"/>
+                  <a:cs typeface="Source Sans Pro Light" charset="0"/>
+                </a:rPr>
+                <a:t> </a:t>
+              </a:r>
+              <a:r>
+                <a:rPr lang="en-US" sz="1400" b="0" i="0" spc="0" dirty="0">
+                  <a:ln>
+                    <a:noFill/>
+                  </a:ln>
+                  <a:solidFill>
+                    <a:schemeClr val="tx2"/>
+                  </a:solidFill>
+                  <a:latin typeface="Source Sans Pro Light" charset="0"/>
+                  <a:ea typeface="Source Sans Pro Light" charset="0"/>
+                  <a:cs typeface="Source Sans Pro Light" charset="0"/>
+                </a:rPr>
+                <a:t>throws a Java Exception</a:t>
+              </a:r>
+            </a:p>
+          </p:txBody>
+        </p:sp>
+        <p:sp>
+          <p:nvSpPr>
+            <p:cNvPr id="40" name="Oval 39">
+              <a:extLst>
+                <a:ext uri="{FF2B5EF4-FFF2-40B4-BE49-F238E27FC236}">
+                  <a16:creationId xmlns:a16="http://schemas.microsoft.com/office/drawing/2014/main" id="{0EAABFFE-D5C9-8F37-0CB0-F908D45E583F}"/>
+                </a:ext>
+              </a:extLst>
+            </p:cNvPr>
+            <p:cNvSpPr/>
+            <p:nvPr/>
+          </p:nvSpPr>
+          <p:spPr>
+            <a:xfrm>
+              <a:off x="4860454" y="2312317"/>
+              <a:ext cx="210892" cy="206944"/>
+            </a:xfrm>
+            <a:prstGeom prst="ellipse">
+              <a:avLst/>
+            </a:prstGeom>
+            <a:ln>
+              <a:noFill/>
+            </a:ln>
+          </p:spPr>
+          <p:style>
+            <a:lnRef idx="2">
+              <a:schemeClr val="accent1">
+                <a:shade val="50000"/>
+              </a:schemeClr>
+            </a:lnRef>
+            <a:fillRef idx="1">
+              <a:schemeClr val="accent1"/>
+            </a:fillRef>
+            <a:effectRef idx="0">
+              <a:schemeClr val="accent1"/>
+            </a:effectRef>
+            <a:fontRef idx="minor">
+              <a:schemeClr val="lt1"/>
+            </a:fontRef>
+          </p:style>
+          <p:txBody>
+            <a:bodyPr rtlCol="0" anchor="ctr"/>
+            <a:lstStyle/>
+            <a:p>
+              <a:pPr algn="ctr"/>
+              <a:r>
+                <a:rPr lang="en-US" sz="1200" b="1" dirty="0">
+                  <a:solidFill>
+                    <a:schemeClr val="bg1"/>
+                  </a:solidFill>
+                  <a:latin typeface="Source Sans Pro" panose="020B0503030403020204" pitchFamily="34" charset="0"/>
+                  <a:ea typeface="Source Sans Pro" panose="020B0503030403020204" pitchFamily="34" charset="0"/>
+                  <a:cs typeface="Source Sans Pro Light" charset="0"/>
+                </a:rPr>
+                <a:t>1</a:t>
+              </a:r>
+            </a:p>
+          </p:txBody>
+        </p:sp>
+      </p:grpSp>
+      <p:grpSp>
+        <p:nvGrpSpPr>
+          <p:cNvPr id="47" name="Group 46">
+            <a:extLst>
+              <a:ext uri="{FF2B5EF4-FFF2-40B4-BE49-F238E27FC236}">
+                <a16:creationId xmlns:a16="http://schemas.microsoft.com/office/drawing/2014/main" id="{DBDD7FA6-C613-D28E-CC2A-F25C35B0599C}"/>
+              </a:ext>
+            </a:extLst>
+          </p:cNvPr>
+          <p:cNvGrpSpPr/>
+          <p:nvPr/>
+        </p:nvGrpSpPr>
+        <p:grpSpPr>
+          <a:xfrm>
+            <a:off x="4860454" y="3087680"/>
+            <a:ext cx="3114847" cy="215444"/>
+            <a:chOff x="4971025" y="2890783"/>
+            <a:chExt cx="3114847" cy="215444"/>
+          </a:xfrm>
+        </p:grpSpPr>
+        <p:sp>
+          <p:nvSpPr>
+            <p:cNvPr id="31" name="TextBox 30">
+              <a:extLst>
+                <a:ext uri="{FF2B5EF4-FFF2-40B4-BE49-F238E27FC236}">
+                  <a16:creationId xmlns:a16="http://schemas.microsoft.com/office/drawing/2014/main" id="{812E7825-E249-3965-1440-540BC3225ECD}"/>
+                </a:ext>
+              </a:extLst>
+            </p:cNvPr>
+            <p:cNvSpPr txBox="1"/>
+            <p:nvPr/>
+          </p:nvSpPr>
+          <p:spPr>
+            <a:xfrm>
+              <a:off x="5250159" y="2890783"/>
+              <a:ext cx="2835713" cy="215444"/>
+            </a:xfrm>
+            <a:prstGeom prst="rect">
+              <a:avLst/>
+            </a:prstGeom>
+            <a:noFill/>
+          </p:spPr>
+          <p:txBody>
+            <a:bodyPr vert="horz" wrap="none" lIns="0" tIns="0" rIns="0" bIns="0" numCol="1" spcCol="288000" rtlCol="0" anchor="t" anchorCtr="0">
+              <a:spAutoFit/>
+            </a:bodyPr>
+            <a:lstStyle/>
+            <a:p>
+              <a:pPr algn="l">
+                <a:spcBef>
+                  <a:spcPts val="0"/>
+                </a:spcBef>
+                <a:spcAft>
+                  <a:spcPts val="600"/>
+                </a:spcAft>
+              </a:pPr>
+              <a:r>
+                <a:rPr lang="en-US" sz="1400" b="0" i="0" spc="0" dirty="0">
+                  <a:ln>
+                    <a:noFill/>
+                  </a:ln>
+                  <a:solidFill>
+                    <a:schemeClr val="tx2"/>
+                  </a:solidFill>
+                  <a:latin typeface="Source Sans Pro Light" charset="0"/>
+                  <a:ea typeface="Source Sans Pro Light" charset="0"/>
+                  <a:cs typeface="Source Sans Pro Light" charset="0"/>
+                </a:rPr>
+                <a:t>The exception </a:t>
+              </a:r>
+              <a:r>
+                <a:rPr lang="en-US" sz="1400" dirty="0">
+                  <a:solidFill>
+                    <a:schemeClr val="tx2"/>
+                  </a:solidFill>
+                  <a:latin typeface="Source Sans Pro Light" charset="0"/>
+                  <a:ea typeface="Source Sans Pro Light" charset="0"/>
+                  <a:cs typeface="Source Sans Pro Light" charset="0"/>
+                </a:rPr>
+                <a:t>t</a:t>
+              </a:r>
+              <a:r>
+                <a:rPr lang="en-US" sz="1400" b="0" i="0" spc="0" dirty="0">
+                  <a:ln>
+                    <a:noFill/>
+                  </a:ln>
+                  <a:solidFill>
+                    <a:schemeClr val="tx2"/>
+                  </a:solidFill>
+                  <a:latin typeface="Source Sans Pro Light" charset="0"/>
+                  <a:ea typeface="Source Sans Pro Light" charset="0"/>
+                  <a:cs typeface="Source Sans Pro Light" charset="0"/>
+                </a:rPr>
+                <a:t>raverses C stack frames</a:t>
+              </a:r>
+            </a:p>
+          </p:txBody>
+        </p:sp>
+        <p:sp>
+          <p:nvSpPr>
+            <p:cNvPr id="43" name="Oval 42">
+              <a:extLst>
+                <a:ext uri="{FF2B5EF4-FFF2-40B4-BE49-F238E27FC236}">
+                  <a16:creationId xmlns:a16="http://schemas.microsoft.com/office/drawing/2014/main" id="{7239EF6D-F49D-1391-5EA9-B9FB7A0ED733}"/>
+                </a:ext>
+              </a:extLst>
+            </p:cNvPr>
+            <p:cNvSpPr/>
+            <p:nvPr/>
+          </p:nvSpPr>
+          <p:spPr>
+            <a:xfrm>
+              <a:off x="4971025" y="2895033"/>
+              <a:ext cx="210892" cy="206944"/>
+            </a:xfrm>
+            <a:prstGeom prst="ellipse">
+              <a:avLst/>
+            </a:prstGeom>
+            <a:ln>
+              <a:noFill/>
+            </a:ln>
+          </p:spPr>
+          <p:style>
+            <a:lnRef idx="2">
+              <a:schemeClr val="accent1">
+                <a:shade val="50000"/>
+              </a:schemeClr>
+            </a:lnRef>
+            <a:fillRef idx="1">
+              <a:schemeClr val="accent1"/>
+            </a:fillRef>
+            <a:effectRef idx="0">
+              <a:schemeClr val="accent1"/>
+            </a:effectRef>
+            <a:fontRef idx="minor">
+              <a:schemeClr val="lt1"/>
+            </a:fontRef>
+          </p:style>
+          <p:txBody>
+            <a:bodyPr rtlCol="0" anchor="ctr"/>
+            <a:lstStyle/>
+            <a:p>
+              <a:pPr algn="ctr"/>
+              <a:r>
+                <a:rPr lang="en-US" sz="1200" b="1" dirty="0">
+                  <a:solidFill>
+                    <a:schemeClr val="bg1"/>
+                  </a:solidFill>
+                  <a:latin typeface="Source Sans Pro" panose="020B0503030403020204" pitchFamily="34" charset="0"/>
+                  <a:ea typeface="Source Sans Pro" panose="020B0503030403020204" pitchFamily="34" charset="0"/>
+                  <a:cs typeface="Source Sans Pro Light" charset="0"/>
+                </a:rPr>
+                <a:t>2</a:t>
+              </a:r>
+            </a:p>
+          </p:txBody>
+        </p:sp>
+      </p:grpSp>
+      <p:grpSp>
+        <p:nvGrpSpPr>
+          <p:cNvPr id="49" name="Group 48">
+            <a:extLst>
+              <a:ext uri="{FF2B5EF4-FFF2-40B4-BE49-F238E27FC236}">
+                <a16:creationId xmlns:a16="http://schemas.microsoft.com/office/drawing/2014/main" id="{A9BEA545-3A2A-267A-5309-043A883EB183}"/>
+              </a:ext>
+            </a:extLst>
+          </p:cNvPr>
+          <p:cNvGrpSpPr/>
+          <p:nvPr/>
+        </p:nvGrpSpPr>
+        <p:grpSpPr>
+          <a:xfrm>
+            <a:off x="4860454" y="3782368"/>
+            <a:ext cx="3673421" cy="215444"/>
+            <a:chOff x="4902054" y="3782368"/>
+            <a:chExt cx="3673421" cy="215444"/>
+          </a:xfrm>
+        </p:grpSpPr>
+        <p:sp>
+          <p:nvSpPr>
+            <p:cNvPr id="44" name="Oval 43">
+              <a:extLst>
+                <a:ext uri="{FF2B5EF4-FFF2-40B4-BE49-F238E27FC236}">
+                  <a16:creationId xmlns:a16="http://schemas.microsoft.com/office/drawing/2014/main" id="{0D6E2032-ECB3-A052-00E2-7A25BEF30E0F}"/>
+                </a:ext>
+              </a:extLst>
+            </p:cNvPr>
+            <p:cNvSpPr/>
+            <p:nvPr/>
+          </p:nvSpPr>
+          <p:spPr>
+            <a:xfrm>
+              <a:off x="4902054" y="3788157"/>
+              <a:ext cx="210892" cy="206944"/>
+            </a:xfrm>
+            <a:prstGeom prst="ellipse">
+              <a:avLst/>
+            </a:prstGeom>
+            <a:ln>
+              <a:noFill/>
+            </a:ln>
+          </p:spPr>
+          <p:style>
+            <a:lnRef idx="2">
+              <a:schemeClr val="accent1">
+                <a:shade val="50000"/>
+              </a:schemeClr>
+            </a:lnRef>
+            <a:fillRef idx="1">
+              <a:schemeClr val="accent1"/>
+            </a:fillRef>
+            <a:effectRef idx="0">
+              <a:schemeClr val="accent1"/>
+            </a:effectRef>
+            <a:fontRef idx="minor">
+              <a:schemeClr val="lt1"/>
+            </a:fontRef>
+          </p:style>
+          <p:txBody>
+            <a:bodyPr rtlCol="0" anchor="ctr"/>
+            <a:lstStyle/>
+            <a:p>
+              <a:pPr algn="ctr"/>
+              <a:r>
+                <a:rPr lang="en-US" sz="1200" b="1" dirty="0">
+                  <a:solidFill>
+                    <a:schemeClr val="bg1"/>
+                  </a:solidFill>
+                  <a:latin typeface="Source Sans Pro" panose="020B0503030403020204" pitchFamily="34" charset="0"/>
+                  <a:ea typeface="Source Sans Pro" panose="020B0503030403020204" pitchFamily="34" charset="0"/>
+                  <a:cs typeface="Source Sans Pro Light" charset="0"/>
+                </a:rPr>
+                <a:t>3</a:t>
+              </a:r>
+            </a:p>
+          </p:txBody>
+        </p:sp>
+        <p:sp>
+          <p:nvSpPr>
+            <p:cNvPr id="45" name="TextBox 44">
+              <a:extLst>
+                <a:ext uri="{FF2B5EF4-FFF2-40B4-BE49-F238E27FC236}">
+                  <a16:creationId xmlns:a16="http://schemas.microsoft.com/office/drawing/2014/main" id="{C8CF75AF-C87F-3E89-EB17-DED6B663527E}"/>
+                </a:ext>
+              </a:extLst>
+            </p:cNvPr>
+            <p:cNvSpPr txBox="1"/>
+            <p:nvPr/>
+          </p:nvSpPr>
+          <p:spPr>
+            <a:xfrm>
+              <a:off x="5181917" y="3782368"/>
+              <a:ext cx="3393558" cy="215444"/>
+            </a:xfrm>
+            <a:prstGeom prst="rect">
+              <a:avLst/>
+            </a:prstGeom>
+            <a:noFill/>
+          </p:spPr>
+          <p:txBody>
+            <a:bodyPr vert="horz" wrap="none" lIns="0" tIns="0" rIns="0" bIns="0" numCol="1" spcCol="288000" rtlCol="0" anchor="t" anchorCtr="0">
+              <a:spAutoFit/>
+            </a:bodyPr>
+            <a:lstStyle/>
+            <a:p>
+              <a:pPr algn="l">
+                <a:spcBef>
+                  <a:spcPts val="0"/>
+                </a:spcBef>
+                <a:spcAft>
+                  <a:spcPts val="600"/>
+                </a:spcAft>
+              </a:pPr>
+              <a:r>
+                <a:rPr lang="en-US" sz="1400" b="0" i="0" spc="0" dirty="0">
+                  <a:ln>
+                    <a:noFill/>
+                  </a:ln>
+                  <a:solidFill>
+                    <a:schemeClr val="tx2"/>
+                  </a:solidFill>
+                  <a:latin typeface="Source Sans Pro Light" charset="0"/>
+                  <a:ea typeface="Source Sans Pro Light" charset="0"/>
+                  <a:cs typeface="Source Sans Pro Light" charset="0"/>
+                </a:rPr>
+                <a:t>The exception is caught by a Java host method</a:t>
+              </a:r>
+            </a:p>
+          </p:txBody>
+        </p:sp>
+      </p:grpSp>
+    </p:spTree>
+    <p:extLst>
+      <p:ext uri="{BB962C8B-B14F-4D97-AF65-F5344CB8AC3E}">
+        <p14:creationId xmlns:p14="http://schemas.microsoft.com/office/powerpoint/2010/main" val="2148170692"/>
       </p:ext>
     </p:extLst>
   </p:cSld>

</xml_diff>